<commit_message>
Add more UT test cases to TooltipsLab
</commit_message>
<xml_diff>
--- a/doc/test/TooltipsLab/CreateCallout.pptx
+++ b/doc/test/TooltipsLab/CreateCallout.pptx
@@ -7,7 +7,7 @@
     <p:sldMasterId id="2147483672" r:id="rId3"/>
   </p:sldMasterIdLst>
   <p:notesMasterIdLst>
-    <p:notesMasterId r:id="rId22"/>
+    <p:notesMasterId r:id="rId25"/>
   </p:notesMasterIdLst>
   <p:sldIdLst>
     <p:sldId id="287" r:id="rId4"/>
@@ -27,7 +27,10 @@
     <p:sldId id="327" r:id="rId18"/>
     <p:sldId id="329" r:id="rId19"/>
     <p:sldId id="328" r:id="rId20"/>
-    <p:sldId id="305" r:id="rId21"/>
+    <p:sldId id="330" r:id="rId21"/>
+    <p:sldId id="331" r:id="rId22"/>
+    <p:sldId id="332" r:id="rId23"/>
+    <p:sldId id="305" r:id="rId24"/>
   </p:sldIdLst>
   <p:sldSz cx="9144000" cy="6858000" type="screen4x3"/>
   <p:notesSz cx="6858000" cy="9144000"/>
@@ -152,6 +155,9 @@
             <p14:sldId id="327"/>
             <p14:sldId id="329"/>
             <p14:sldId id="328"/>
+            <p14:sldId id="330"/>
+            <p14:sldId id="331"/>
+            <p14:sldId id="332"/>
             <p14:sldId id="305"/>
           </p14:sldIdLst>
         </p14:section>
@@ -257,7 +263,7 @@
           <a:p>
             <a:fld id="{7B6B14F6-3F9A-43ED-BCC2-4547CC5017BD}" type="datetimeFigureOut">
               <a:rPr lang="en-SG" smtClean="0"/>
-              <a:t>3/4/2019</a:t>
+              <a:t>7/4/2019</a:t>
             </a:fld>
             <a:endParaRPr lang="en-SG"/>
           </a:p>
@@ -790,7 +796,7 @@
           <a:p>
             <a:fld id="{699DC775-C286-4358-8C92-D7E584E969B3}" type="datetimeFigureOut">
               <a:rPr lang="en-US" smtClean="0"/>
-              <a:t>4/3/2019</a:t>
+              <a:t>4/7/2019</a:t>
             </a:fld>
             <a:endParaRPr lang="en-US"/>
           </a:p>
@@ -960,7 +966,7 @@
           <a:p>
             <a:fld id="{699DC775-C286-4358-8C92-D7E584E969B3}" type="datetimeFigureOut">
               <a:rPr lang="en-US" smtClean="0"/>
-              <a:t>4/3/2019</a:t>
+              <a:t>4/7/2019</a:t>
             </a:fld>
             <a:endParaRPr lang="en-US"/>
           </a:p>
@@ -1140,7 +1146,7 @@
           <a:p>
             <a:fld id="{699DC775-C286-4358-8C92-D7E584E969B3}" type="datetimeFigureOut">
               <a:rPr lang="en-US" smtClean="0"/>
-              <a:t>4/3/2019</a:t>
+              <a:t>4/7/2019</a:t>
             </a:fld>
             <a:endParaRPr lang="en-US"/>
           </a:p>
@@ -1382,7 +1388,7 @@
           <a:p>
             <a:fld id="{699DC775-C286-4358-8C92-D7E584E969B3}" type="datetimeFigureOut">
               <a:rPr lang="en-US" smtClean="0"/>
-              <a:t>4/3/2019</a:t>
+              <a:t>4/7/2019</a:t>
             </a:fld>
             <a:endParaRPr lang="en-US"/>
           </a:p>
@@ -1552,7 +1558,7 @@
           <a:p>
             <a:fld id="{699DC775-C286-4358-8C92-D7E584E969B3}" type="datetimeFigureOut">
               <a:rPr lang="en-US" smtClean="0"/>
-              <a:t>4/3/2019</a:t>
+              <a:t>4/7/2019</a:t>
             </a:fld>
             <a:endParaRPr lang="en-US"/>
           </a:p>
@@ -1798,7 +1804,7 @@
           <a:p>
             <a:fld id="{699DC775-C286-4358-8C92-D7E584E969B3}" type="datetimeFigureOut">
               <a:rPr lang="en-US" smtClean="0"/>
-              <a:t>4/3/2019</a:t>
+              <a:t>4/7/2019</a:t>
             </a:fld>
             <a:endParaRPr lang="en-US"/>
           </a:p>
@@ -2086,7 +2092,7 @@
           <a:p>
             <a:fld id="{699DC775-C286-4358-8C92-D7E584E969B3}" type="datetimeFigureOut">
               <a:rPr lang="en-US" smtClean="0"/>
-              <a:t>4/3/2019</a:t>
+              <a:t>4/7/2019</a:t>
             </a:fld>
             <a:endParaRPr lang="en-US"/>
           </a:p>
@@ -2508,7 +2514,7 @@
           <a:p>
             <a:fld id="{699DC775-C286-4358-8C92-D7E584E969B3}" type="datetimeFigureOut">
               <a:rPr lang="en-US" smtClean="0"/>
-              <a:t>4/3/2019</a:t>
+              <a:t>4/7/2019</a:t>
             </a:fld>
             <a:endParaRPr lang="en-US"/>
           </a:p>
@@ -2626,7 +2632,7 @@
           <a:p>
             <a:fld id="{699DC775-C286-4358-8C92-D7E584E969B3}" type="datetimeFigureOut">
               <a:rPr lang="en-US" smtClean="0"/>
-              <a:t>4/3/2019</a:t>
+              <a:t>4/7/2019</a:t>
             </a:fld>
             <a:endParaRPr lang="en-US"/>
           </a:p>
@@ -2721,7 +2727,7 @@
           <a:p>
             <a:fld id="{699DC775-C286-4358-8C92-D7E584E969B3}" type="datetimeFigureOut">
               <a:rPr lang="en-US" smtClean="0"/>
-              <a:t>4/3/2019</a:t>
+              <a:t>4/7/2019</a:t>
             </a:fld>
             <a:endParaRPr lang="en-US"/>
           </a:p>
@@ -2998,7 +3004,7 @@
           <a:p>
             <a:fld id="{699DC775-C286-4358-8C92-D7E584E969B3}" type="datetimeFigureOut">
               <a:rPr lang="en-US" smtClean="0"/>
-              <a:t>4/3/2019</a:t>
+              <a:t>4/7/2019</a:t>
             </a:fld>
             <a:endParaRPr lang="en-US"/>
           </a:p>
@@ -3168,7 +3174,7 @@
           <a:p>
             <a:fld id="{699DC775-C286-4358-8C92-D7E584E969B3}" type="datetimeFigureOut">
               <a:rPr lang="en-US" smtClean="0"/>
-              <a:t>4/3/2019</a:t>
+              <a:t>4/7/2019</a:t>
             </a:fld>
             <a:endParaRPr lang="en-US"/>
           </a:p>
@@ -3421,7 +3427,7 @@
           <a:p>
             <a:fld id="{699DC775-C286-4358-8C92-D7E584E969B3}" type="datetimeFigureOut">
               <a:rPr lang="en-US" smtClean="0"/>
-              <a:t>4/3/2019</a:t>
+              <a:t>4/7/2019</a:t>
             </a:fld>
             <a:endParaRPr lang="en-US"/>
           </a:p>
@@ -3591,7 +3597,7 @@
           <a:p>
             <a:fld id="{699DC775-C286-4358-8C92-D7E584E969B3}" type="datetimeFigureOut">
               <a:rPr lang="en-US" smtClean="0"/>
-              <a:t>4/3/2019</a:t>
+              <a:t>4/7/2019</a:t>
             </a:fld>
             <a:endParaRPr lang="en-US"/>
           </a:p>
@@ -3771,7 +3777,7 @@
           <a:p>
             <a:fld id="{699DC775-C286-4358-8C92-D7E584E969B3}" type="datetimeFigureOut">
               <a:rPr lang="en-US" smtClean="0"/>
-              <a:t>4/3/2019</a:t>
+              <a:t>4/7/2019</a:t>
             </a:fld>
             <a:endParaRPr lang="en-US"/>
           </a:p>
@@ -4013,7 +4019,7 @@
           <a:p>
             <a:fld id="{699DC775-C286-4358-8C92-D7E584E969B3}" type="datetimeFigureOut">
               <a:rPr lang="en-US" smtClean="0"/>
-              <a:t>4/3/2019</a:t>
+              <a:t>4/7/2019</a:t>
             </a:fld>
             <a:endParaRPr lang="en-US"/>
           </a:p>
@@ -4183,7 +4189,7 @@
           <a:p>
             <a:fld id="{699DC775-C286-4358-8C92-D7E584E969B3}" type="datetimeFigureOut">
               <a:rPr lang="en-US" smtClean="0"/>
-              <a:t>4/3/2019</a:t>
+              <a:t>4/7/2019</a:t>
             </a:fld>
             <a:endParaRPr lang="en-US"/>
           </a:p>
@@ -4429,7 +4435,7 @@
           <a:p>
             <a:fld id="{699DC775-C286-4358-8C92-D7E584E969B3}" type="datetimeFigureOut">
               <a:rPr lang="en-US" smtClean="0"/>
-              <a:t>4/3/2019</a:t>
+              <a:t>4/7/2019</a:t>
             </a:fld>
             <a:endParaRPr lang="en-US"/>
           </a:p>
@@ -4717,7 +4723,7 @@
           <a:p>
             <a:fld id="{699DC775-C286-4358-8C92-D7E584E969B3}" type="datetimeFigureOut">
               <a:rPr lang="en-US" smtClean="0"/>
-              <a:t>4/3/2019</a:t>
+              <a:t>4/7/2019</a:t>
             </a:fld>
             <a:endParaRPr lang="en-US"/>
           </a:p>
@@ -5139,7 +5145,7 @@
           <a:p>
             <a:fld id="{699DC775-C286-4358-8C92-D7E584E969B3}" type="datetimeFigureOut">
               <a:rPr lang="en-US" smtClean="0"/>
-              <a:t>4/3/2019</a:t>
+              <a:t>4/7/2019</a:t>
             </a:fld>
             <a:endParaRPr lang="en-US"/>
           </a:p>
@@ -5257,7 +5263,7 @@
           <a:p>
             <a:fld id="{699DC775-C286-4358-8C92-D7E584E969B3}" type="datetimeFigureOut">
               <a:rPr lang="en-US" smtClean="0"/>
-              <a:t>4/3/2019</a:t>
+              <a:t>4/7/2019</a:t>
             </a:fld>
             <a:endParaRPr lang="en-US"/>
           </a:p>
@@ -5352,7 +5358,7 @@
           <a:p>
             <a:fld id="{699DC775-C286-4358-8C92-D7E584E969B3}" type="datetimeFigureOut">
               <a:rPr lang="en-US" smtClean="0"/>
-              <a:t>4/3/2019</a:t>
+              <a:t>4/7/2019</a:t>
             </a:fld>
             <a:endParaRPr lang="en-US"/>
           </a:p>
@@ -5598,7 +5604,7 @@
           <a:p>
             <a:fld id="{699DC775-C286-4358-8C92-D7E584E969B3}" type="datetimeFigureOut">
               <a:rPr lang="en-US" smtClean="0"/>
-              <a:t>4/3/2019</a:t>
+              <a:t>4/7/2019</a:t>
             </a:fld>
             <a:endParaRPr lang="en-US"/>
           </a:p>
@@ -5875,7 +5881,7 @@
           <a:p>
             <a:fld id="{699DC775-C286-4358-8C92-D7E584E969B3}" type="datetimeFigureOut">
               <a:rPr lang="en-US" smtClean="0"/>
-              <a:t>4/3/2019</a:t>
+              <a:t>4/7/2019</a:t>
             </a:fld>
             <a:endParaRPr lang="en-US"/>
           </a:p>
@@ -6128,7 +6134,7 @@
           <a:p>
             <a:fld id="{699DC775-C286-4358-8C92-D7E584E969B3}" type="datetimeFigureOut">
               <a:rPr lang="en-US" smtClean="0"/>
-              <a:t>4/3/2019</a:t>
+              <a:t>4/7/2019</a:t>
             </a:fld>
             <a:endParaRPr lang="en-US"/>
           </a:p>
@@ -6298,7 +6304,7 @@
           <a:p>
             <a:fld id="{699DC775-C286-4358-8C92-D7E584E969B3}" type="datetimeFigureOut">
               <a:rPr lang="en-US" smtClean="0"/>
-              <a:t>4/3/2019</a:t>
+              <a:t>4/7/2019</a:t>
             </a:fld>
             <a:endParaRPr lang="en-US"/>
           </a:p>
@@ -6478,7 +6484,7 @@
           <a:p>
             <a:fld id="{699DC775-C286-4358-8C92-D7E584E969B3}" type="datetimeFigureOut">
               <a:rPr lang="en-US" smtClean="0"/>
-              <a:t>4/3/2019</a:t>
+              <a:t>4/7/2019</a:t>
             </a:fld>
             <a:endParaRPr lang="en-US"/>
           </a:p>
@@ -6766,7 +6772,7 @@
           <a:p>
             <a:fld id="{699DC775-C286-4358-8C92-D7E584E969B3}" type="datetimeFigureOut">
               <a:rPr lang="en-US" smtClean="0"/>
-              <a:t>4/3/2019</a:t>
+              <a:t>4/7/2019</a:t>
             </a:fld>
             <a:endParaRPr lang="en-US"/>
           </a:p>
@@ -7188,7 +7194,7 @@
           <a:p>
             <a:fld id="{699DC775-C286-4358-8C92-D7E584E969B3}" type="datetimeFigureOut">
               <a:rPr lang="en-US" smtClean="0"/>
-              <a:t>4/3/2019</a:t>
+              <a:t>4/7/2019</a:t>
             </a:fld>
             <a:endParaRPr lang="en-US"/>
           </a:p>
@@ -7306,7 +7312,7 @@
           <a:p>
             <a:fld id="{699DC775-C286-4358-8C92-D7E584E969B3}" type="datetimeFigureOut">
               <a:rPr lang="en-US" smtClean="0"/>
-              <a:t>4/3/2019</a:t>
+              <a:t>4/7/2019</a:t>
             </a:fld>
             <a:endParaRPr lang="en-US"/>
           </a:p>
@@ -7401,7 +7407,7 @@
           <a:p>
             <a:fld id="{699DC775-C286-4358-8C92-D7E584E969B3}" type="datetimeFigureOut">
               <a:rPr lang="en-US" smtClean="0"/>
-              <a:t>4/3/2019</a:t>
+              <a:t>4/7/2019</a:t>
             </a:fld>
             <a:endParaRPr lang="en-US"/>
           </a:p>
@@ -7678,7 +7684,7 @@
           <a:p>
             <a:fld id="{699DC775-C286-4358-8C92-D7E584E969B3}" type="datetimeFigureOut">
               <a:rPr lang="en-US" smtClean="0"/>
-              <a:t>4/3/2019</a:t>
+              <a:t>4/7/2019</a:t>
             </a:fld>
             <a:endParaRPr lang="en-US"/>
           </a:p>
@@ -7931,7 +7937,7 @@
           <a:p>
             <a:fld id="{699DC775-C286-4358-8C92-D7E584E969B3}" type="datetimeFigureOut">
               <a:rPr lang="en-US" smtClean="0"/>
-              <a:t>4/3/2019</a:t>
+              <a:t>4/7/2019</a:t>
             </a:fld>
             <a:endParaRPr lang="en-US"/>
           </a:p>
@@ -8147,7 +8153,7 @@
           <a:p>
             <a:fld id="{699DC775-C286-4358-8C92-D7E584E969B3}" type="datetimeFigureOut">
               <a:rPr lang="en-US" smtClean="0"/>
-              <a:t>4/3/2019</a:t>
+              <a:t>4/7/2019</a:t>
             </a:fld>
             <a:endParaRPr lang="en-US"/>
           </a:p>
@@ -8660,7 +8666,7 @@
           <a:p>
             <a:fld id="{699DC775-C286-4358-8C92-D7E584E969B3}" type="datetimeFigureOut">
               <a:rPr lang="en-US" smtClean="0"/>
-              <a:t>4/3/2019</a:t>
+              <a:t>4/7/2019</a:t>
             </a:fld>
             <a:endParaRPr lang="en-US"/>
           </a:p>
@@ -9173,7 +9179,7 @@
           <a:p>
             <a:fld id="{699DC775-C286-4358-8C92-D7E584E969B3}" type="datetimeFigureOut">
               <a:rPr lang="en-US" smtClean="0"/>
-              <a:t>4/3/2019</a:t>
+              <a:t>4/7/2019</a:t>
             </a:fld>
             <a:endParaRPr lang="en-US"/>
           </a:p>
@@ -10685,11 +10691,7 @@
           <a:p>
             <a:r>
               <a:rPr lang="en-US" dirty="0" smtClean="0"/>
-              <a:t>Create </a:t>
-            </a:r>
-            <a:r>
-              <a:rPr lang="en-US" dirty="0" smtClean="0"/>
-              <a:t>Callout: Select multiple normal shape</a:t>
+              <a:t>Create Callout: Select multiple normal shape</a:t>
             </a:r>
             <a:endParaRPr lang="en-SG" dirty="0"/>
           </a:p>
@@ -10717,30 +10719,14 @@
           <a:p>
             <a:r>
               <a:rPr lang="en-US" dirty="0" smtClean="0"/>
-              <a:t>Select </a:t>
-            </a:r>
+              <a:t>Select all the normal shapes</a:t>
+            </a:r>
+            <a:endParaRPr lang="en-US" dirty="0"/>
+          </a:p>
+          <a:p>
             <a:r>
               <a:rPr lang="en-US" dirty="0" smtClean="0"/>
-              <a:t>all the </a:t>
-            </a:r>
-            <a:r>
-              <a:rPr lang="en-US" dirty="0" smtClean="0"/>
-              <a:t>normal shapes</a:t>
-            </a:r>
-            <a:endParaRPr lang="en-US" dirty="0"/>
-          </a:p>
-          <a:p>
-            <a:r>
-              <a:rPr lang="en-US" dirty="0" smtClean="0"/>
-              <a:t>Click </a:t>
-            </a:r>
-            <a:r>
-              <a:rPr lang="en-US" dirty="0" smtClean="0"/>
-              <a:t>‘Create </a:t>
-            </a:r>
-            <a:r>
-              <a:rPr lang="en-US" dirty="0" smtClean="0"/>
-              <a:t>Callout for Shape’</a:t>
+              <a:t>Click ‘Create Callout for Shape’</a:t>
             </a:r>
             <a:endParaRPr lang="en-SG" dirty="0"/>
           </a:p>
@@ -12583,11 +12569,7 @@
           <a:p>
             <a:r>
               <a:rPr lang="en-US" dirty="0" smtClean="0"/>
-              <a:t>Create </a:t>
-            </a:r>
-            <a:r>
-              <a:rPr lang="en-US" dirty="0" smtClean="0"/>
-              <a:t>Callout: Select multiple shape of any type</a:t>
+              <a:t>Create Callout: Select multiple shape of any type</a:t>
             </a:r>
             <a:endParaRPr lang="en-SG" dirty="0"/>
           </a:p>
@@ -12615,30 +12597,14 @@
           <a:p>
             <a:r>
               <a:rPr lang="en-US" dirty="0" smtClean="0"/>
-              <a:t>Select </a:t>
-            </a:r>
+              <a:t>Select all the shapes (consists of normal, existing tooltip and existing callouts)</a:t>
+            </a:r>
+            <a:endParaRPr lang="en-US" dirty="0"/>
+          </a:p>
+          <a:p>
             <a:r>
               <a:rPr lang="en-US" dirty="0" smtClean="0"/>
-              <a:t>all the </a:t>
-            </a:r>
-            <a:r>
-              <a:rPr lang="en-US" dirty="0" smtClean="0"/>
-              <a:t>shapes (consists of normal, existing tooltip and existing callouts)</a:t>
-            </a:r>
-            <a:endParaRPr lang="en-US" dirty="0"/>
-          </a:p>
-          <a:p>
-            <a:r>
-              <a:rPr lang="en-US" dirty="0" smtClean="0"/>
-              <a:t>Click </a:t>
-            </a:r>
-            <a:r>
-              <a:rPr lang="en-US" dirty="0" smtClean="0"/>
-              <a:t>‘Create </a:t>
-            </a:r>
-            <a:r>
-              <a:rPr lang="en-US" dirty="0" smtClean="0"/>
-              <a:t>Callout for Shape’</a:t>
+              <a:t>Click ‘Create Callout for Shape’</a:t>
             </a:r>
             <a:endParaRPr lang="en-SG" dirty="0"/>
           </a:p>
@@ -18328,6 +18294,3065 @@
 </file>
 
 <file path=ppt/slides/slide18.xml><?xml version="1.0" encoding="utf-8"?>
+<p:sld xmlns:a="http://schemas.openxmlformats.org/drawingml/2006/main" xmlns:r="http://schemas.openxmlformats.org/officeDocument/2006/relationships" xmlns:p="http://schemas.openxmlformats.org/presentationml/2006/main">
+  <p:cSld>
+    <p:bg>
+      <p:bgPr>
+        <a:solidFill>
+          <a:srgbClr val="0070BF"/>
+        </a:solidFill>
+        <a:effectLst/>
+      </p:bgPr>
+    </p:bg>
+    <p:spTree>
+      <p:nvGrpSpPr>
+        <p:cNvPr id="1" name=""/>
+        <p:cNvGrpSpPr/>
+        <p:nvPr/>
+      </p:nvGrpSpPr>
+      <p:grpSpPr>
+        <a:xfrm>
+          <a:off x="0" y="0"/>
+          <a:ext cx="0" cy="0"/>
+          <a:chOff x="0" y="0"/>
+          <a:chExt cx="0" cy="0"/>
+        </a:xfrm>
+      </p:grpSpPr>
+      <p:sp>
+        <p:nvSpPr>
+          <p:cNvPr id="2" name="Title 1"/>
+          <p:cNvSpPr>
+            <a:spLocks noGrp="1"/>
+          </p:cNvSpPr>
+          <p:nvPr>
+            <p:ph type="title"/>
+          </p:nvPr>
+        </p:nvSpPr>
+        <p:spPr>
+          <a:solidFill>
+            <a:srgbClr val="0070BF"/>
+          </a:solidFill>
+        </p:spPr>
+        <p:txBody>
+          <a:bodyPr/>
+          <a:lstStyle/>
+          <a:p>
+            <a:r>
+              <a:rPr lang="en-US" dirty="0" smtClean="0"/>
+              <a:t>Create Trigger: </a:t>
+            </a:r>
+            <a:r>
+              <a:rPr lang="en-US" dirty="0" smtClean="0"/>
+              <a:t>Select multiple shapes of different types (more variations)</a:t>
+            </a:r>
+            <a:endParaRPr lang="en-SG" dirty="0"/>
+          </a:p>
+        </p:txBody>
+      </p:sp>
+      <p:sp>
+        <p:nvSpPr>
+          <p:cNvPr id="4" name="Content Placeholder 2"/>
+          <p:cNvSpPr>
+            <a:spLocks noGrp="1"/>
+          </p:cNvSpPr>
+          <p:nvPr>
+            <p:ph idx="1"/>
+          </p:nvPr>
+        </p:nvSpPr>
+        <p:spPr>
+          <a:xfrm>
+            <a:off x="457200" y="3124200"/>
+            <a:ext cx="8229600" cy="3001963"/>
+          </a:xfrm>
+        </p:spPr>
+        <p:txBody>
+          <a:bodyPr/>
+          <a:lstStyle/>
+          <a:p>
+            <a:r>
+              <a:rPr lang="en-US" dirty="0" smtClean="0"/>
+              <a:t>Select all the shapes (consists of </a:t>
+            </a:r>
+            <a:r>
+              <a:rPr lang="en-US" dirty="0" smtClean="0"/>
+              <a:t>lines, arrows, action buttons, etc</a:t>
+            </a:r>
+            <a:r>
+              <a:rPr lang="en-US" dirty="0"/>
+              <a:t>.</a:t>
+            </a:r>
+            <a:r>
+              <a:rPr lang="en-US" dirty="0" smtClean="0"/>
+              <a:t>)</a:t>
+            </a:r>
+            <a:endParaRPr lang="en-US" dirty="0"/>
+          </a:p>
+          <a:p>
+            <a:r>
+              <a:rPr lang="en-US" dirty="0" smtClean="0"/>
+              <a:t>Click ‘Create </a:t>
+            </a:r>
+            <a:r>
+              <a:rPr lang="en-US" dirty="0" smtClean="0"/>
+              <a:t>Callout for </a:t>
+            </a:r>
+            <a:r>
+              <a:rPr lang="en-US" dirty="0" smtClean="0"/>
+              <a:t>Shape’</a:t>
+            </a:r>
+            <a:endParaRPr lang="en-SG" dirty="0"/>
+          </a:p>
+        </p:txBody>
+      </p:sp>
+    </p:spTree>
+    <p:extLst>
+      <p:ext uri="{BB962C8B-B14F-4D97-AF65-F5344CB8AC3E}">
+        <p14:creationId xmlns:p14="http://schemas.microsoft.com/office/powerpoint/2010/main" val="986299494"/>
+      </p:ext>
+    </p:extLst>
+  </p:cSld>
+  <p:clrMapOvr>
+    <a:masterClrMapping/>
+  </p:clrMapOvr>
+  <p:timing>
+    <p:tnLst>
+      <p:par>
+        <p:cTn id="1" dur="indefinite" restart="never" nodeType="tmRoot"/>
+      </p:par>
+    </p:tnLst>
+  </p:timing>
+</p:sld>
+</file>
+
+<file path=ppt/slides/slide19.xml><?xml version="1.0" encoding="utf-8"?>
+<p:sld xmlns:a="http://schemas.openxmlformats.org/drawingml/2006/main" xmlns:r="http://schemas.openxmlformats.org/officeDocument/2006/relationships" xmlns:p="http://schemas.openxmlformats.org/presentationml/2006/main">
+  <p:cSld>
+    <p:spTree>
+      <p:nvGrpSpPr>
+        <p:cNvPr id="1" name=""/>
+        <p:cNvGrpSpPr/>
+        <p:nvPr/>
+      </p:nvGrpSpPr>
+      <p:grpSpPr>
+        <a:xfrm>
+          <a:off x="0" y="0"/>
+          <a:ext cx="0" cy="0"/>
+          <a:chOff x="0" y="0"/>
+          <a:chExt cx="0" cy="0"/>
+        </a:xfrm>
+      </p:grpSpPr>
+      <p:cxnSp>
+        <p:nvCxnSpPr>
+          <p:cNvPr id="17" name="select_straight"/>
+          <p:cNvCxnSpPr/>
+          <p:nvPr/>
+        </p:nvCxnSpPr>
+        <p:spPr>
+          <a:xfrm>
+            <a:off x="2362200" y="2819400"/>
+            <a:ext cx="1447800" cy="1066800"/>
+          </a:xfrm>
+          <a:prstGeom prst="line">
+            <a:avLst/>
+          </a:prstGeom>
+          <a:ln w="76200">
+            <a:solidFill>
+              <a:srgbClr val="E46C0A"/>
+            </a:solidFill>
+          </a:ln>
+        </p:spPr>
+        <p:style>
+          <a:lnRef idx="1">
+            <a:schemeClr val="accent1"/>
+          </a:lnRef>
+          <a:fillRef idx="0">
+            <a:schemeClr val="accent1"/>
+          </a:fillRef>
+          <a:effectRef idx="0">
+            <a:schemeClr val="accent1"/>
+          </a:effectRef>
+          <a:fontRef idx="minor">
+            <a:schemeClr val="tx1"/>
+          </a:fontRef>
+        </p:style>
+      </p:cxnSp>
+      <p:cxnSp>
+        <p:nvCxnSpPr>
+          <p:cNvPr id="19" name="select_elbow"/>
+          <p:cNvCxnSpPr/>
+          <p:nvPr/>
+        </p:nvCxnSpPr>
+        <p:spPr>
+          <a:xfrm>
+            <a:off x="3200400" y="1676400"/>
+            <a:ext cx="2743200" cy="1828800"/>
+          </a:xfrm>
+          <a:prstGeom prst="bentConnector3">
+            <a:avLst/>
+          </a:prstGeom>
+          <a:ln>
+            <a:headEnd type="triangle"/>
+            <a:tailEnd type="triangle"/>
+          </a:ln>
+        </p:spPr>
+        <p:style>
+          <a:lnRef idx="1">
+            <a:schemeClr val="accent1"/>
+          </a:lnRef>
+          <a:fillRef idx="0">
+            <a:schemeClr val="accent1"/>
+          </a:fillRef>
+          <a:effectRef idx="0">
+            <a:schemeClr val="accent1"/>
+          </a:effectRef>
+          <a:fontRef idx="minor">
+            <a:schemeClr val="tx1"/>
+          </a:fontRef>
+        </p:style>
+      </p:cxnSp>
+      <p:sp>
+        <p:nvSpPr>
+          <p:cNvPr id="20" name="select_freeform"/>
+          <p:cNvSpPr/>
+          <p:nvPr/>
+        </p:nvSpPr>
+        <p:spPr>
+          <a:xfrm>
+            <a:off x="685800" y="3048000"/>
+            <a:ext cx="3025498" cy="2810706"/>
+          </a:xfrm>
+          <a:custGeom>
+            <a:avLst/>
+            <a:gdLst>
+              <a:gd name="connsiteX0" fmla="*/ 1251930 w 3025498"/>
+              <a:gd name="connsiteY0" fmla="*/ 0 h 2810706"/>
+              <a:gd name="connsiteX1" fmla="*/ 1251930 w 3025498"/>
+              <a:gd name="connsiteY1" fmla="*/ 0 h 2810706"/>
+              <a:gd name="connsiteX2" fmla="*/ 1202835 w 3025498"/>
+              <a:gd name="connsiteY2" fmla="*/ 42959 h 2810706"/>
+              <a:gd name="connsiteX3" fmla="*/ 1092370 w 3025498"/>
+              <a:gd name="connsiteY3" fmla="*/ 153423 h 2810706"/>
+              <a:gd name="connsiteX4" fmla="*/ 1024864 w 3025498"/>
+              <a:gd name="connsiteY4" fmla="*/ 251614 h 2810706"/>
+              <a:gd name="connsiteX5" fmla="*/ 951221 w 3025498"/>
+              <a:gd name="connsiteY5" fmla="*/ 349804 h 2810706"/>
+              <a:gd name="connsiteX6" fmla="*/ 938948 w 3025498"/>
+              <a:gd name="connsiteY6" fmla="*/ 374352 h 2810706"/>
+              <a:gd name="connsiteX7" fmla="*/ 846894 w 3025498"/>
+              <a:gd name="connsiteY7" fmla="*/ 490953 h 2810706"/>
+              <a:gd name="connsiteX8" fmla="*/ 828483 w 3025498"/>
+              <a:gd name="connsiteY8" fmla="*/ 509364 h 2810706"/>
+              <a:gd name="connsiteX9" fmla="*/ 816209 w 3025498"/>
+              <a:gd name="connsiteY9" fmla="*/ 527775 h 2810706"/>
+              <a:gd name="connsiteX10" fmla="*/ 724156 w 3025498"/>
+              <a:gd name="connsiteY10" fmla="*/ 650513 h 2810706"/>
+              <a:gd name="connsiteX11" fmla="*/ 699608 w 3025498"/>
+              <a:gd name="connsiteY11" fmla="*/ 675061 h 2810706"/>
+              <a:gd name="connsiteX12" fmla="*/ 589144 w 3025498"/>
+              <a:gd name="connsiteY12" fmla="*/ 816210 h 2810706"/>
+              <a:gd name="connsiteX13" fmla="*/ 472542 w 3025498"/>
+              <a:gd name="connsiteY13" fmla="*/ 975769 h 2810706"/>
+              <a:gd name="connsiteX14" fmla="*/ 460268 w 3025498"/>
+              <a:gd name="connsiteY14" fmla="*/ 1000317 h 2810706"/>
+              <a:gd name="connsiteX15" fmla="*/ 386625 w 3025498"/>
+              <a:gd name="connsiteY15" fmla="*/ 1092371 h 2810706"/>
+              <a:gd name="connsiteX16" fmla="*/ 325256 w 3025498"/>
+              <a:gd name="connsiteY16" fmla="*/ 1178287 h 2810706"/>
+              <a:gd name="connsiteX17" fmla="*/ 263887 w 3025498"/>
+              <a:gd name="connsiteY17" fmla="*/ 1233520 h 2810706"/>
+              <a:gd name="connsiteX18" fmla="*/ 202518 w 3025498"/>
+              <a:gd name="connsiteY18" fmla="*/ 1294889 h 2810706"/>
+              <a:gd name="connsiteX19" fmla="*/ 184107 w 3025498"/>
+              <a:gd name="connsiteY19" fmla="*/ 1307163 h 2810706"/>
+              <a:gd name="connsiteX20" fmla="*/ 85917 w 3025498"/>
+              <a:gd name="connsiteY20" fmla="*/ 1386942 h 2810706"/>
+              <a:gd name="connsiteX21" fmla="*/ 55232 w 3025498"/>
+              <a:gd name="connsiteY21" fmla="*/ 1411490 h 2810706"/>
+              <a:gd name="connsiteX22" fmla="*/ 0 w 3025498"/>
+              <a:gd name="connsiteY22" fmla="*/ 2092687 h 2810706"/>
+              <a:gd name="connsiteX23" fmla="*/ 1595597 w 3025498"/>
+              <a:gd name="connsiteY23" fmla="*/ 2810706 h 2810706"/>
+              <a:gd name="connsiteX24" fmla="*/ 3025498 w 3025498"/>
+              <a:gd name="connsiteY24" fmla="*/ 1896306 h 2810706"/>
+              <a:gd name="connsiteX25" fmla="*/ 2160193 w 3025498"/>
+              <a:gd name="connsiteY25" fmla="*/ 472542 h 2810706"/>
+              <a:gd name="connsiteX26" fmla="*/ 1301025 w 3025498"/>
+              <a:gd name="connsiteY26" fmla="*/ 2049729 h 2810706"/>
+              <a:gd name="connsiteX27" fmla="*/ 1110781 w 3025498"/>
+              <a:gd name="connsiteY27" fmla="*/ 331393 h 2810706"/>
+              <a:gd name="connsiteX28" fmla="*/ 1251930 w 3025498"/>
+              <a:gd name="connsiteY28" fmla="*/ 0 h 2810706"/>
+            </a:gdLst>
+            <a:ahLst/>
+            <a:cxnLst>
+              <a:cxn ang="0">
+                <a:pos x="connsiteX0" y="connsiteY0"/>
+              </a:cxn>
+              <a:cxn ang="0">
+                <a:pos x="connsiteX1" y="connsiteY1"/>
+              </a:cxn>
+              <a:cxn ang="0">
+                <a:pos x="connsiteX2" y="connsiteY2"/>
+              </a:cxn>
+              <a:cxn ang="0">
+                <a:pos x="connsiteX3" y="connsiteY3"/>
+              </a:cxn>
+              <a:cxn ang="0">
+                <a:pos x="connsiteX4" y="connsiteY4"/>
+              </a:cxn>
+              <a:cxn ang="0">
+                <a:pos x="connsiteX5" y="connsiteY5"/>
+              </a:cxn>
+              <a:cxn ang="0">
+                <a:pos x="connsiteX6" y="connsiteY6"/>
+              </a:cxn>
+              <a:cxn ang="0">
+                <a:pos x="connsiteX7" y="connsiteY7"/>
+              </a:cxn>
+              <a:cxn ang="0">
+                <a:pos x="connsiteX8" y="connsiteY8"/>
+              </a:cxn>
+              <a:cxn ang="0">
+                <a:pos x="connsiteX9" y="connsiteY9"/>
+              </a:cxn>
+              <a:cxn ang="0">
+                <a:pos x="connsiteX10" y="connsiteY10"/>
+              </a:cxn>
+              <a:cxn ang="0">
+                <a:pos x="connsiteX11" y="connsiteY11"/>
+              </a:cxn>
+              <a:cxn ang="0">
+                <a:pos x="connsiteX12" y="connsiteY12"/>
+              </a:cxn>
+              <a:cxn ang="0">
+                <a:pos x="connsiteX13" y="connsiteY13"/>
+              </a:cxn>
+              <a:cxn ang="0">
+                <a:pos x="connsiteX14" y="connsiteY14"/>
+              </a:cxn>
+              <a:cxn ang="0">
+                <a:pos x="connsiteX15" y="connsiteY15"/>
+              </a:cxn>
+              <a:cxn ang="0">
+                <a:pos x="connsiteX16" y="connsiteY16"/>
+              </a:cxn>
+              <a:cxn ang="0">
+                <a:pos x="connsiteX17" y="connsiteY17"/>
+              </a:cxn>
+              <a:cxn ang="0">
+                <a:pos x="connsiteX18" y="connsiteY18"/>
+              </a:cxn>
+              <a:cxn ang="0">
+                <a:pos x="connsiteX19" y="connsiteY19"/>
+              </a:cxn>
+              <a:cxn ang="0">
+                <a:pos x="connsiteX20" y="connsiteY20"/>
+              </a:cxn>
+              <a:cxn ang="0">
+                <a:pos x="connsiteX21" y="connsiteY21"/>
+              </a:cxn>
+              <a:cxn ang="0">
+                <a:pos x="connsiteX22" y="connsiteY22"/>
+              </a:cxn>
+              <a:cxn ang="0">
+                <a:pos x="connsiteX23" y="connsiteY23"/>
+              </a:cxn>
+              <a:cxn ang="0">
+                <a:pos x="connsiteX24" y="connsiteY24"/>
+              </a:cxn>
+              <a:cxn ang="0">
+                <a:pos x="connsiteX25" y="connsiteY25"/>
+              </a:cxn>
+              <a:cxn ang="0">
+                <a:pos x="connsiteX26" y="connsiteY26"/>
+              </a:cxn>
+              <a:cxn ang="0">
+                <a:pos x="connsiteX27" y="connsiteY27"/>
+              </a:cxn>
+              <a:cxn ang="0">
+                <a:pos x="connsiteX28" y="connsiteY28"/>
+              </a:cxn>
+            </a:cxnLst>
+            <a:rect l="l" t="t" r="r" b="b"/>
+            <a:pathLst>
+              <a:path w="3025498" h="2810706">
+                <a:moveTo>
+                  <a:pt x="1251930" y="0"/>
+                </a:moveTo>
+                <a:lnTo>
+                  <a:pt x="1251930" y="0"/>
+                </a:lnTo>
+                <a:cubicBezTo>
+                  <a:pt x="1235565" y="14320"/>
+                  <a:pt x="1219665" y="29189"/>
+                  <a:pt x="1202835" y="42959"/>
+                </a:cubicBezTo>
+                <a:cubicBezTo>
+                  <a:pt x="1143547" y="91467"/>
+                  <a:pt x="1211041" y="-19190"/>
+                  <a:pt x="1092370" y="153423"/>
+                </a:cubicBezTo>
+                <a:cubicBezTo>
+                  <a:pt x="1069868" y="186153"/>
+                  <a:pt x="1048696" y="219839"/>
+                  <a:pt x="1024864" y="251614"/>
+                </a:cubicBezTo>
+                <a:cubicBezTo>
+                  <a:pt x="1000316" y="284344"/>
+                  <a:pt x="974683" y="316287"/>
+                  <a:pt x="951221" y="349804"/>
+                </a:cubicBezTo>
+                <a:cubicBezTo>
+                  <a:pt x="945975" y="357299"/>
+                  <a:pt x="944386" y="366995"/>
+                  <a:pt x="938948" y="374352"/>
+                </a:cubicBezTo>
+                <a:cubicBezTo>
+                  <a:pt x="909514" y="414175"/>
+                  <a:pt x="878252" y="452627"/>
+                  <a:pt x="846894" y="490953"/>
+                </a:cubicBezTo>
+                <a:cubicBezTo>
+                  <a:pt x="841398" y="497670"/>
+                  <a:pt x="834039" y="502697"/>
+                  <a:pt x="828483" y="509364"/>
+                </a:cubicBezTo>
+                <a:cubicBezTo>
+                  <a:pt x="823761" y="515030"/>
+                  <a:pt x="820593" y="521844"/>
+                  <a:pt x="816209" y="527775"/>
+                </a:cubicBezTo>
+                <a:cubicBezTo>
+                  <a:pt x="785812" y="568901"/>
+                  <a:pt x="755899" y="610416"/>
+                  <a:pt x="724156" y="650513"/>
+                </a:cubicBezTo>
+                <a:cubicBezTo>
+                  <a:pt x="716973" y="659586"/>
+                  <a:pt x="706918" y="666090"/>
+                  <a:pt x="699608" y="675061"/>
+                </a:cubicBezTo>
+                <a:cubicBezTo>
+                  <a:pt x="661869" y="721378"/>
+                  <a:pt x="625147" y="768531"/>
+                  <a:pt x="589144" y="816210"/>
+                </a:cubicBezTo>
+                <a:cubicBezTo>
+                  <a:pt x="549448" y="868781"/>
+                  <a:pt x="502002" y="916849"/>
+                  <a:pt x="472542" y="975769"/>
+                </a:cubicBezTo>
+                <a:cubicBezTo>
+                  <a:pt x="468451" y="983952"/>
+                  <a:pt x="465695" y="992952"/>
+                  <a:pt x="460268" y="1000317"/>
+                </a:cubicBezTo>
+                <a:cubicBezTo>
+                  <a:pt x="436958" y="1031952"/>
+                  <a:pt x="410375" y="1061065"/>
+                  <a:pt x="386625" y="1092371"/>
+                </a:cubicBezTo>
+                <a:cubicBezTo>
+                  <a:pt x="365354" y="1120410"/>
+                  <a:pt x="351415" y="1154743"/>
+                  <a:pt x="325256" y="1178287"/>
+                </a:cubicBezTo>
+                <a:cubicBezTo>
+                  <a:pt x="304800" y="1196698"/>
+                  <a:pt x="283840" y="1214565"/>
+                  <a:pt x="263887" y="1233520"/>
+                </a:cubicBezTo>
+                <a:cubicBezTo>
+                  <a:pt x="242913" y="1253445"/>
+                  <a:pt x="223776" y="1275267"/>
+                  <a:pt x="202518" y="1294889"/>
+                </a:cubicBezTo>
+                <a:cubicBezTo>
+                  <a:pt x="197098" y="1299892"/>
+                  <a:pt x="189565" y="1302202"/>
+                  <a:pt x="184107" y="1307163"/>
+                </a:cubicBezTo>
+                <a:cubicBezTo>
+                  <a:pt x="20759" y="1455661"/>
+                  <a:pt x="238529" y="1272483"/>
+                  <a:pt x="85917" y="1386942"/>
+                </a:cubicBezTo>
+                <a:cubicBezTo>
+                  <a:pt x="51258" y="1412937"/>
+                  <a:pt x="74473" y="1411490"/>
+                  <a:pt x="55232" y="1411490"/>
+                </a:cubicBezTo>
+                <a:lnTo>
+                  <a:pt x="0" y="2092687"/>
+                </a:lnTo>
+                <a:lnTo>
+                  <a:pt x="1595597" y="2810706"/>
+                </a:lnTo>
+                <a:lnTo>
+                  <a:pt x="3025498" y="1896306"/>
+                </a:lnTo>
+                <a:lnTo>
+                  <a:pt x="2160193" y="472542"/>
+                </a:lnTo>
+                <a:lnTo>
+                  <a:pt x="1301025" y="2049729"/>
+                </a:lnTo>
+                <a:lnTo>
+                  <a:pt x="1110781" y="331393"/>
+                </a:lnTo>
+                <a:lnTo>
+                  <a:pt x="1251930" y="0"/>
+                </a:lnTo>
+                <a:close/>
+              </a:path>
+            </a:pathLst>
+          </a:custGeom>
+          <a:solidFill>
+            <a:schemeClr val="accent2"/>
+          </a:solidFill>
+        </p:spPr>
+        <p:style>
+          <a:lnRef idx="2">
+            <a:schemeClr val="accent1">
+              <a:shade val="50000"/>
+            </a:schemeClr>
+          </a:lnRef>
+          <a:fillRef idx="1">
+            <a:schemeClr val="accent1"/>
+          </a:fillRef>
+          <a:effectRef idx="0">
+            <a:schemeClr val="accent1"/>
+          </a:effectRef>
+          <a:fontRef idx="minor">
+            <a:schemeClr val="lt1"/>
+          </a:fontRef>
+        </p:style>
+        <p:txBody>
+          <a:bodyPr rtlCol="0" anchor="ctr"/>
+          <a:lstStyle/>
+          <a:p>
+            <a:pPr algn="ctr"/>
+            <a:endParaRPr lang="en-SG" dirty="0"/>
+          </a:p>
+        </p:txBody>
+      </p:sp>
+      <p:sp>
+        <p:nvSpPr>
+          <p:cNvPr id="21" name="select_no"/>
+          <p:cNvSpPr/>
+          <p:nvPr/>
+        </p:nvSpPr>
+        <p:spPr>
+          <a:xfrm>
+            <a:off x="3791078" y="4724400"/>
+            <a:ext cx="1752600" cy="1371600"/>
+          </a:xfrm>
+          <a:prstGeom prst="noSmoking">
+            <a:avLst/>
+          </a:prstGeom>
+        </p:spPr>
+        <p:style>
+          <a:lnRef idx="2">
+            <a:schemeClr val="accent1">
+              <a:shade val="50000"/>
+            </a:schemeClr>
+          </a:lnRef>
+          <a:fillRef idx="1">
+            <a:schemeClr val="accent1"/>
+          </a:fillRef>
+          <a:effectRef idx="0">
+            <a:schemeClr val="accent1"/>
+          </a:effectRef>
+          <a:fontRef idx="minor">
+            <a:schemeClr val="lt1"/>
+          </a:fontRef>
+        </p:style>
+        <p:txBody>
+          <a:bodyPr rtlCol="0" anchor="ctr"/>
+          <a:lstStyle/>
+          <a:p>
+            <a:pPr algn="ctr"/>
+            <a:endParaRPr lang="en-SG">
+              <a:solidFill>
+                <a:schemeClr val="tx1"/>
+              </a:solidFill>
+            </a:endParaRPr>
+          </a:p>
+        </p:txBody>
+      </p:sp>
+      <p:sp>
+        <p:nvSpPr>
+          <p:cNvPr id="22" name="select_quadArrow"/>
+          <p:cNvSpPr/>
+          <p:nvPr/>
+        </p:nvSpPr>
+        <p:spPr>
+          <a:xfrm>
+            <a:off x="5791200" y="3377859"/>
+            <a:ext cx="1752600" cy="1519653"/>
+          </a:xfrm>
+          <a:prstGeom prst="quadArrow">
+            <a:avLst/>
+          </a:prstGeom>
+        </p:spPr>
+        <p:style>
+          <a:lnRef idx="2">
+            <a:schemeClr val="accent1">
+              <a:shade val="50000"/>
+            </a:schemeClr>
+          </a:lnRef>
+          <a:fillRef idx="1">
+            <a:schemeClr val="accent1"/>
+          </a:fillRef>
+          <a:effectRef idx="0">
+            <a:schemeClr val="accent1"/>
+          </a:effectRef>
+          <a:fontRef idx="minor">
+            <a:schemeClr val="lt1"/>
+          </a:fontRef>
+        </p:style>
+        <p:txBody>
+          <a:bodyPr rtlCol="0" anchor="ctr"/>
+          <a:lstStyle/>
+          <a:p>
+            <a:pPr algn="ctr"/>
+            <a:endParaRPr lang="en-SG"/>
+          </a:p>
+        </p:txBody>
+      </p:sp>
+      <p:sp>
+        <p:nvSpPr>
+          <p:cNvPr id="23" name="select_notEqual"/>
+          <p:cNvSpPr/>
+          <p:nvPr/>
+        </p:nvSpPr>
+        <p:spPr>
+          <a:xfrm>
+            <a:off x="3505200" y="2707274"/>
+            <a:ext cx="3048000" cy="1636126"/>
+          </a:xfrm>
+          <a:prstGeom prst="mathNotEqual">
+            <a:avLst/>
+          </a:prstGeom>
+        </p:spPr>
+        <p:style>
+          <a:lnRef idx="2">
+            <a:schemeClr val="accent1">
+              <a:shade val="50000"/>
+            </a:schemeClr>
+          </a:lnRef>
+          <a:fillRef idx="1">
+            <a:schemeClr val="accent1"/>
+          </a:fillRef>
+          <a:effectRef idx="0">
+            <a:schemeClr val="accent1"/>
+          </a:effectRef>
+          <a:fontRef idx="minor">
+            <a:schemeClr val="lt1"/>
+          </a:fontRef>
+        </p:style>
+        <p:txBody>
+          <a:bodyPr rtlCol="0" anchor="ctr"/>
+          <a:lstStyle/>
+          <a:p>
+            <a:pPr algn="ctr"/>
+            <a:endParaRPr lang="en-SG">
+              <a:solidFill>
+                <a:schemeClr val="tx1"/>
+              </a:solidFill>
+            </a:endParaRPr>
+          </a:p>
+        </p:txBody>
+      </p:sp>
+      <p:sp>
+        <p:nvSpPr>
+          <p:cNvPr id="24" name="select_explosion"/>
+          <p:cNvSpPr/>
+          <p:nvPr/>
+        </p:nvSpPr>
+        <p:spPr>
+          <a:xfrm>
+            <a:off x="914400" y="1371600"/>
+            <a:ext cx="1284149" cy="1524000"/>
+          </a:xfrm>
+          <a:prstGeom prst="irregularSeal2">
+            <a:avLst/>
+          </a:prstGeom>
+        </p:spPr>
+        <p:style>
+          <a:lnRef idx="2">
+            <a:schemeClr val="accent1">
+              <a:shade val="50000"/>
+            </a:schemeClr>
+          </a:lnRef>
+          <a:fillRef idx="1">
+            <a:schemeClr val="accent1"/>
+          </a:fillRef>
+          <a:effectRef idx="0">
+            <a:schemeClr val="accent1"/>
+          </a:effectRef>
+          <a:fontRef idx="minor">
+            <a:schemeClr val="lt1"/>
+          </a:fontRef>
+        </p:style>
+        <p:txBody>
+          <a:bodyPr rtlCol="0" anchor="ctr"/>
+          <a:lstStyle/>
+          <a:p>
+            <a:pPr algn="ctr"/>
+            <a:endParaRPr lang="en-SG"/>
+          </a:p>
+        </p:txBody>
+      </p:sp>
+      <p:sp>
+        <p:nvSpPr>
+          <p:cNvPr id="25" name="select_actionButton">
+            <a:hlinkClick r:id="" action="ppaction://hlinkshowjump?jump=lastslide" highlightClick="1"/>
+          </p:cNvPr>
+          <p:cNvSpPr/>
+          <p:nvPr/>
+        </p:nvSpPr>
+        <p:spPr>
+          <a:xfrm>
+            <a:off x="6553200" y="5676900"/>
+            <a:ext cx="1066800" cy="838200"/>
+          </a:xfrm>
+          <a:prstGeom prst="actionButtonEnd">
+            <a:avLst/>
+          </a:prstGeom>
+        </p:spPr>
+        <p:style>
+          <a:lnRef idx="2">
+            <a:schemeClr val="accent1">
+              <a:shade val="50000"/>
+            </a:schemeClr>
+          </a:lnRef>
+          <a:fillRef idx="1">
+            <a:schemeClr val="accent1"/>
+          </a:fillRef>
+          <a:effectRef idx="0">
+            <a:schemeClr val="accent1"/>
+          </a:effectRef>
+          <a:fontRef idx="minor">
+            <a:schemeClr val="lt1"/>
+          </a:fontRef>
+        </p:style>
+        <p:txBody>
+          <a:bodyPr rtlCol="0" anchor="ctr"/>
+          <a:lstStyle/>
+          <a:p>
+            <a:pPr algn="ctr"/>
+            <a:endParaRPr lang="en-SG"/>
+          </a:p>
+        </p:txBody>
+      </p:sp>
+    </p:spTree>
+    <p:extLst>
+      <p:ext uri="{BB962C8B-B14F-4D97-AF65-F5344CB8AC3E}">
+        <p14:creationId xmlns:p14="http://schemas.microsoft.com/office/powerpoint/2010/main" val="2961258091"/>
+      </p:ext>
+    </p:extLst>
+  </p:cSld>
+  <p:clrMapOvr>
+    <a:masterClrMapping/>
+  </p:clrMapOvr>
+  <p:timing>
+    <p:tnLst>
+      <p:par>
+        <p:cTn id="1" dur="indefinite" restart="never" nodeType="tmRoot"/>
+      </p:par>
+    </p:tnLst>
+  </p:timing>
+</p:sld>
+</file>
+
+<file path=ppt/slides/slide2.xml><?xml version="1.0" encoding="utf-8"?>
+<p:sld xmlns:a="http://schemas.openxmlformats.org/drawingml/2006/main" xmlns:r="http://schemas.openxmlformats.org/officeDocument/2006/relationships" xmlns:p="http://schemas.openxmlformats.org/presentationml/2006/main">
+  <p:cSld>
+    <p:bg>
+      <p:bgPr>
+        <a:solidFill>
+          <a:srgbClr val="E46C0A"/>
+        </a:solidFill>
+        <a:effectLst/>
+      </p:bgPr>
+    </p:bg>
+    <p:spTree>
+      <p:nvGrpSpPr>
+        <p:cNvPr id="1" name=""/>
+        <p:cNvGrpSpPr/>
+        <p:nvPr/>
+      </p:nvGrpSpPr>
+      <p:grpSpPr>
+        <a:xfrm>
+          <a:off x="0" y="0"/>
+          <a:ext cx="0" cy="0"/>
+          <a:chOff x="0" y="0"/>
+          <a:chExt cx="0" cy="0"/>
+        </a:xfrm>
+      </p:grpSpPr>
+      <p:sp>
+        <p:nvSpPr>
+          <p:cNvPr id="2" name="Title 1"/>
+          <p:cNvSpPr>
+            <a:spLocks noGrp="1"/>
+          </p:cNvSpPr>
+          <p:nvPr>
+            <p:ph type="title"/>
+          </p:nvPr>
+        </p:nvSpPr>
+        <p:spPr>
+          <a:xfrm>
+            <a:off x="381000" y="609600"/>
+            <a:ext cx="8229600" cy="1143000"/>
+          </a:xfrm>
+          <a:solidFill>
+            <a:srgbClr val="E46C0A"/>
+          </a:solidFill>
+        </p:spPr>
+        <p:txBody>
+          <a:bodyPr>
+            <a:noAutofit/>
+          </a:bodyPr>
+          <a:lstStyle/>
+          <a:p>
+            <a:pPr algn="l"/>
+            <a:r>
+              <a:rPr lang="en-US" sz="7200" dirty="0" smtClean="0">
+                <a:solidFill>
+                  <a:schemeClr val="bg1"/>
+                </a:solidFill>
+              </a:rPr>
+              <a:t>Create Callout</a:t>
+            </a:r>
+            <a:endParaRPr lang="en-SG" sz="7200" dirty="0">
+              <a:solidFill>
+                <a:schemeClr val="bg1"/>
+              </a:solidFill>
+            </a:endParaRPr>
+          </a:p>
+        </p:txBody>
+      </p:sp>
+    </p:spTree>
+    <p:extLst>
+      <p:ext uri="{BB962C8B-B14F-4D97-AF65-F5344CB8AC3E}">
+        <p14:creationId xmlns:p14="http://schemas.microsoft.com/office/powerpoint/2010/main" val="1569131388"/>
+      </p:ext>
+    </p:extLst>
+  </p:cSld>
+  <p:clrMapOvr>
+    <a:masterClrMapping/>
+  </p:clrMapOvr>
+  <p:timing>
+    <p:tnLst>
+      <p:par>
+        <p:cTn id="1" dur="indefinite" restart="never" nodeType="tmRoot"/>
+      </p:par>
+    </p:tnLst>
+  </p:timing>
+</p:sld>
+</file>
+
+<file path=ppt/slides/slide20.xml><?xml version="1.0" encoding="utf-8"?>
+<p:sld xmlns:a="http://schemas.openxmlformats.org/drawingml/2006/main" xmlns:r="http://schemas.openxmlformats.org/officeDocument/2006/relationships" xmlns:p="http://schemas.openxmlformats.org/presentationml/2006/main">
+  <p:cSld>
+    <p:spTree>
+      <p:nvGrpSpPr>
+        <p:cNvPr id="1" name=""/>
+        <p:cNvGrpSpPr/>
+        <p:nvPr/>
+      </p:nvGrpSpPr>
+      <p:grpSpPr>
+        <a:xfrm>
+          <a:off x="0" y="0"/>
+          <a:ext cx="0" cy="0"/>
+          <a:chOff x="0" y="0"/>
+          <a:chExt cx="0" cy="0"/>
+        </a:xfrm>
+      </p:grpSpPr>
+      <p:cxnSp>
+        <p:nvCxnSpPr>
+          <p:cNvPr id="17" name="select_straight"/>
+          <p:cNvCxnSpPr/>
+          <p:nvPr/>
+        </p:nvCxnSpPr>
+        <p:spPr>
+          <a:xfrm>
+            <a:off x="2362200" y="2819400"/>
+            <a:ext cx="1447800" cy="1066800"/>
+          </a:xfrm>
+          <a:prstGeom prst="line">
+            <a:avLst/>
+          </a:prstGeom>
+          <a:ln w="76200">
+            <a:solidFill>
+              <a:srgbClr val="E46C0A"/>
+            </a:solidFill>
+          </a:ln>
+        </p:spPr>
+        <p:style>
+          <a:lnRef idx="1">
+            <a:schemeClr val="accent1"/>
+          </a:lnRef>
+          <a:fillRef idx="0">
+            <a:schemeClr val="accent1"/>
+          </a:fillRef>
+          <a:effectRef idx="0">
+            <a:schemeClr val="accent1"/>
+          </a:effectRef>
+          <a:fontRef idx="minor">
+            <a:schemeClr val="tx1"/>
+          </a:fontRef>
+        </p:style>
+      </p:cxnSp>
+      <p:cxnSp>
+        <p:nvCxnSpPr>
+          <p:cNvPr id="19" name="select_elbow"/>
+          <p:cNvCxnSpPr/>
+          <p:nvPr/>
+        </p:nvCxnSpPr>
+        <p:spPr>
+          <a:xfrm>
+            <a:off x="3200400" y="1676400"/>
+            <a:ext cx="2743200" cy="1828800"/>
+          </a:xfrm>
+          <a:prstGeom prst="bentConnector3">
+            <a:avLst/>
+          </a:prstGeom>
+          <a:ln>
+            <a:headEnd type="triangle"/>
+            <a:tailEnd type="triangle"/>
+          </a:ln>
+        </p:spPr>
+        <p:style>
+          <a:lnRef idx="1">
+            <a:schemeClr val="accent1"/>
+          </a:lnRef>
+          <a:fillRef idx="0">
+            <a:schemeClr val="accent1"/>
+          </a:fillRef>
+          <a:effectRef idx="0">
+            <a:schemeClr val="accent1"/>
+          </a:effectRef>
+          <a:fontRef idx="minor">
+            <a:schemeClr val="tx1"/>
+          </a:fontRef>
+        </p:style>
+      </p:cxnSp>
+      <p:sp>
+        <p:nvSpPr>
+          <p:cNvPr id="20" name="select_freeform"/>
+          <p:cNvSpPr/>
+          <p:nvPr/>
+        </p:nvSpPr>
+        <p:spPr>
+          <a:xfrm>
+            <a:off x="685800" y="3048000"/>
+            <a:ext cx="3025498" cy="2810706"/>
+          </a:xfrm>
+          <a:custGeom>
+            <a:avLst/>
+            <a:gdLst>
+              <a:gd name="connsiteX0" fmla="*/ 1251930 w 3025498"/>
+              <a:gd name="connsiteY0" fmla="*/ 0 h 2810706"/>
+              <a:gd name="connsiteX1" fmla="*/ 1251930 w 3025498"/>
+              <a:gd name="connsiteY1" fmla="*/ 0 h 2810706"/>
+              <a:gd name="connsiteX2" fmla="*/ 1202835 w 3025498"/>
+              <a:gd name="connsiteY2" fmla="*/ 42959 h 2810706"/>
+              <a:gd name="connsiteX3" fmla="*/ 1092370 w 3025498"/>
+              <a:gd name="connsiteY3" fmla="*/ 153423 h 2810706"/>
+              <a:gd name="connsiteX4" fmla="*/ 1024864 w 3025498"/>
+              <a:gd name="connsiteY4" fmla="*/ 251614 h 2810706"/>
+              <a:gd name="connsiteX5" fmla="*/ 951221 w 3025498"/>
+              <a:gd name="connsiteY5" fmla="*/ 349804 h 2810706"/>
+              <a:gd name="connsiteX6" fmla="*/ 938948 w 3025498"/>
+              <a:gd name="connsiteY6" fmla="*/ 374352 h 2810706"/>
+              <a:gd name="connsiteX7" fmla="*/ 846894 w 3025498"/>
+              <a:gd name="connsiteY7" fmla="*/ 490953 h 2810706"/>
+              <a:gd name="connsiteX8" fmla="*/ 828483 w 3025498"/>
+              <a:gd name="connsiteY8" fmla="*/ 509364 h 2810706"/>
+              <a:gd name="connsiteX9" fmla="*/ 816209 w 3025498"/>
+              <a:gd name="connsiteY9" fmla="*/ 527775 h 2810706"/>
+              <a:gd name="connsiteX10" fmla="*/ 724156 w 3025498"/>
+              <a:gd name="connsiteY10" fmla="*/ 650513 h 2810706"/>
+              <a:gd name="connsiteX11" fmla="*/ 699608 w 3025498"/>
+              <a:gd name="connsiteY11" fmla="*/ 675061 h 2810706"/>
+              <a:gd name="connsiteX12" fmla="*/ 589144 w 3025498"/>
+              <a:gd name="connsiteY12" fmla="*/ 816210 h 2810706"/>
+              <a:gd name="connsiteX13" fmla="*/ 472542 w 3025498"/>
+              <a:gd name="connsiteY13" fmla="*/ 975769 h 2810706"/>
+              <a:gd name="connsiteX14" fmla="*/ 460268 w 3025498"/>
+              <a:gd name="connsiteY14" fmla="*/ 1000317 h 2810706"/>
+              <a:gd name="connsiteX15" fmla="*/ 386625 w 3025498"/>
+              <a:gd name="connsiteY15" fmla="*/ 1092371 h 2810706"/>
+              <a:gd name="connsiteX16" fmla="*/ 325256 w 3025498"/>
+              <a:gd name="connsiteY16" fmla="*/ 1178287 h 2810706"/>
+              <a:gd name="connsiteX17" fmla="*/ 263887 w 3025498"/>
+              <a:gd name="connsiteY17" fmla="*/ 1233520 h 2810706"/>
+              <a:gd name="connsiteX18" fmla="*/ 202518 w 3025498"/>
+              <a:gd name="connsiteY18" fmla="*/ 1294889 h 2810706"/>
+              <a:gd name="connsiteX19" fmla="*/ 184107 w 3025498"/>
+              <a:gd name="connsiteY19" fmla="*/ 1307163 h 2810706"/>
+              <a:gd name="connsiteX20" fmla="*/ 85917 w 3025498"/>
+              <a:gd name="connsiteY20" fmla="*/ 1386942 h 2810706"/>
+              <a:gd name="connsiteX21" fmla="*/ 55232 w 3025498"/>
+              <a:gd name="connsiteY21" fmla="*/ 1411490 h 2810706"/>
+              <a:gd name="connsiteX22" fmla="*/ 0 w 3025498"/>
+              <a:gd name="connsiteY22" fmla="*/ 2092687 h 2810706"/>
+              <a:gd name="connsiteX23" fmla="*/ 1595597 w 3025498"/>
+              <a:gd name="connsiteY23" fmla="*/ 2810706 h 2810706"/>
+              <a:gd name="connsiteX24" fmla="*/ 3025498 w 3025498"/>
+              <a:gd name="connsiteY24" fmla="*/ 1896306 h 2810706"/>
+              <a:gd name="connsiteX25" fmla="*/ 2160193 w 3025498"/>
+              <a:gd name="connsiteY25" fmla="*/ 472542 h 2810706"/>
+              <a:gd name="connsiteX26" fmla="*/ 1301025 w 3025498"/>
+              <a:gd name="connsiteY26" fmla="*/ 2049729 h 2810706"/>
+              <a:gd name="connsiteX27" fmla="*/ 1110781 w 3025498"/>
+              <a:gd name="connsiteY27" fmla="*/ 331393 h 2810706"/>
+              <a:gd name="connsiteX28" fmla="*/ 1251930 w 3025498"/>
+              <a:gd name="connsiteY28" fmla="*/ 0 h 2810706"/>
+            </a:gdLst>
+            <a:ahLst/>
+            <a:cxnLst>
+              <a:cxn ang="0">
+                <a:pos x="connsiteX0" y="connsiteY0"/>
+              </a:cxn>
+              <a:cxn ang="0">
+                <a:pos x="connsiteX1" y="connsiteY1"/>
+              </a:cxn>
+              <a:cxn ang="0">
+                <a:pos x="connsiteX2" y="connsiteY2"/>
+              </a:cxn>
+              <a:cxn ang="0">
+                <a:pos x="connsiteX3" y="connsiteY3"/>
+              </a:cxn>
+              <a:cxn ang="0">
+                <a:pos x="connsiteX4" y="connsiteY4"/>
+              </a:cxn>
+              <a:cxn ang="0">
+                <a:pos x="connsiteX5" y="connsiteY5"/>
+              </a:cxn>
+              <a:cxn ang="0">
+                <a:pos x="connsiteX6" y="connsiteY6"/>
+              </a:cxn>
+              <a:cxn ang="0">
+                <a:pos x="connsiteX7" y="connsiteY7"/>
+              </a:cxn>
+              <a:cxn ang="0">
+                <a:pos x="connsiteX8" y="connsiteY8"/>
+              </a:cxn>
+              <a:cxn ang="0">
+                <a:pos x="connsiteX9" y="connsiteY9"/>
+              </a:cxn>
+              <a:cxn ang="0">
+                <a:pos x="connsiteX10" y="connsiteY10"/>
+              </a:cxn>
+              <a:cxn ang="0">
+                <a:pos x="connsiteX11" y="connsiteY11"/>
+              </a:cxn>
+              <a:cxn ang="0">
+                <a:pos x="connsiteX12" y="connsiteY12"/>
+              </a:cxn>
+              <a:cxn ang="0">
+                <a:pos x="connsiteX13" y="connsiteY13"/>
+              </a:cxn>
+              <a:cxn ang="0">
+                <a:pos x="connsiteX14" y="connsiteY14"/>
+              </a:cxn>
+              <a:cxn ang="0">
+                <a:pos x="connsiteX15" y="connsiteY15"/>
+              </a:cxn>
+              <a:cxn ang="0">
+                <a:pos x="connsiteX16" y="connsiteY16"/>
+              </a:cxn>
+              <a:cxn ang="0">
+                <a:pos x="connsiteX17" y="connsiteY17"/>
+              </a:cxn>
+              <a:cxn ang="0">
+                <a:pos x="connsiteX18" y="connsiteY18"/>
+              </a:cxn>
+              <a:cxn ang="0">
+                <a:pos x="connsiteX19" y="connsiteY19"/>
+              </a:cxn>
+              <a:cxn ang="0">
+                <a:pos x="connsiteX20" y="connsiteY20"/>
+              </a:cxn>
+              <a:cxn ang="0">
+                <a:pos x="connsiteX21" y="connsiteY21"/>
+              </a:cxn>
+              <a:cxn ang="0">
+                <a:pos x="connsiteX22" y="connsiteY22"/>
+              </a:cxn>
+              <a:cxn ang="0">
+                <a:pos x="connsiteX23" y="connsiteY23"/>
+              </a:cxn>
+              <a:cxn ang="0">
+                <a:pos x="connsiteX24" y="connsiteY24"/>
+              </a:cxn>
+              <a:cxn ang="0">
+                <a:pos x="connsiteX25" y="connsiteY25"/>
+              </a:cxn>
+              <a:cxn ang="0">
+                <a:pos x="connsiteX26" y="connsiteY26"/>
+              </a:cxn>
+              <a:cxn ang="0">
+                <a:pos x="connsiteX27" y="connsiteY27"/>
+              </a:cxn>
+              <a:cxn ang="0">
+                <a:pos x="connsiteX28" y="connsiteY28"/>
+              </a:cxn>
+            </a:cxnLst>
+            <a:rect l="l" t="t" r="r" b="b"/>
+            <a:pathLst>
+              <a:path w="3025498" h="2810706">
+                <a:moveTo>
+                  <a:pt x="1251930" y="0"/>
+                </a:moveTo>
+                <a:lnTo>
+                  <a:pt x="1251930" y="0"/>
+                </a:lnTo>
+                <a:cubicBezTo>
+                  <a:pt x="1235565" y="14320"/>
+                  <a:pt x="1219665" y="29189"/>
+                  <a:pt x="1202835" y="42959"/>
+                </a:cubicBezTo>
+                <a:cubicBezTo>
+                  <a:pt x="1143547" y="91467"/>
+                  <a:pt x="1211041" y="-19190"/>
+                  <a:pt x="1092370" y="153423"/>
+                </a:cubicBezTo>
+                <a:cubicBezTo>
+                  <a:pt x="1069868" y="186153"/>
+                  <a:pt x="1048696" y="219839"/>
+                  <a:pt x="1024864" y="251614"/>
+                </a:cubicBezTo>
+                <a:cubicBezTo>
+                  <a:pt x="1000316" y="284344"/>
+                  <a:pt x="974683" y="316287"/>
+                  <a:pt x="951221" y="349804"/>
+                </a:cubicBezTo>
+                <a:cubicBezTo>
+                  <a:pt x="945975" y="357299"/>
+                  <a:pt x="944386" y="366995"/>
+                  <a:pt x="938948" y="374352"/>
+                </a:cubicBezTo>
+                <a:cubicBezTo>
+                  <a:pt x="909514" y="414175"/>
+                  <a:pt x="878252" y="452627"/>
+                  <a:pt x="846894" y="490953"/>
+                </a:cubicBezTo>
+                <a:cubicBezTo>
+                  <a:pt x="841398" y="497670"/>
+                  <a:pt x="834039" y="502697"/>
+                  <a:pt x="828483" y="509364"/>
+                </a:cubicBezTo>
+                <a:cubicBezTo>
+                  <a:pt x="823761" y="515030"/>
+                  <a:pt x="820593" y="521844"/>
+                  <a:pt x="816209" y="527775"/>
+                </a:cubicBezTo>
+                <a:cubicBezTo>
+                  <a:pt x="785812" y="568901"/>
+                  <a:pt x="755899" y="610416"/>
+                  <a:pt x="724156" y="650513"/>
+                </a:cubicBezTo>
+                <a:cubicBezTo>
+                  <a:pt x="716973" y="659586"/>
+                  <a:pt x="706918" y="666090"/>
+                  <a:pt x="699608" y="675061"/>
+                </a:cubicBezTo>
+                <a:cubicBezTo>
+                  <a:pt x="661869" y="721378"/>
+                  <a:pt x="625147" y="768531"/>
+                  <a:pt x="589144" y="816210"/>
+                </a:cubicBezTo>
+                <a:cubicBezTo>
+                  <a:pt x="549448" y="868781"/>
+                  <a:pt x="502002" y="916849"/>
+                  <a:pt x="472542" y="975769"/>
+                </a:cubicBezTo>
+                <a:cubicBezTo>
+                  <a:pt x="468451" y="983952"/>
+                  <a:pt x="465695" y="992952"/>
+                  <a:pt x="460268" y="1000317"/>
+                </a:cubicBezTo>
+                <a:cubicBezTo>
+                  <a:pt x="436958" y="1031952"/>
+                  <a:pt x="410375" y="1061065"/>
+                  <a:pt x="386625" y="1092371"/>
+                </a:cubicBezTo>
+                <a:cubicBezTo>
+                  <a:pt x="365354" y="1120410"/>
+                  <a:pt x="351415" y="1154743"/>
+                  <a:pt x="325256" y="1178287"/>
+                </a:cubicBezTo>
+                <a:cubicBezTo>
+                  <a:pt x="304800" y="1196698"/>
+                  <a:pt x="283840" y="1214565"/>
+                  <a:pt x="263887" y="1233520"/>
+                </a:cubicBezTo>
+                <a:cubicBezTo>
+                  <a:pt x="242913" y="1253445"/>
+                  <a:pt x="223776" y="1275267"/>
+                  <a:pt x="202518" y="1294889"/>
+                </a:cubicBezTo>
+                <a:cubicBezTo>
+                  <a:pt x="197098" y="1299892"/>
+                  <a:pt x="189565" y="1302202"/>
+                  <a:pt x="184107" y="1307163"/>
+                </a:cubicBezTo>
+                <a:cubicBezTo>
+                  <a:pt x="20759" y="1455661"/>
+                  <a:pt x="238529" y="1272483"/>
+                  <a:pt x="85917" y="1386942"/>
+                </a:cubicBezTo>
+                <a:cubicBezTo>
+                  <a:pt x="51258" y="1412937"/>
+                  <a:pt x="74473" y="1411490"/>
+                  <a:pt x="55232" y="1411490"/>
+                </a:cubicBezTo>
+                <a:lnTo>
+                  <a:pt x="0" y="2092687"/>
+                </a:lnTo>
+                <a:lnTo>
+                  <a:pt x="1595597" y="2810706"/>
+                </a:lnTo>
+                <a:lnTo>
+                  <a:pt x="3025498" y="1896306"/>
+                </a:lnTo>
+                <a:lnTo>
+                  <a:pt x="2160193" y="472542"/>
+                </a:lnTo>
+                <a:lnTo>
+                  <a:pt x="1301025" y="2049729"/>
+                </a:lnTo>
+                <a:lnTo>
+                  <a:pt x="1110781" y="331393"/>
+                </a:lnTo>
+                <a:lnTo>
+                  <a:pt x="1251930" y="0"/>
+                </a:lnTo>
+                <a:close/>
+              </a:path>
+            </a:pathLst>
+          </a:custGeom>
+          <a:solidFill>
+            <a:schemeClr val="accent2"/>
+          </a:solidFill>
+        </p:spPr>
+        <p:style>
+          <a:lnRef idx="2">
+            <a:schemeClr val="accent1">
+              <a:shade val="50000"/>
+            </a:schemeClr>
+          </a:lnRef>
+          <a:fillRef idx="1">
+            <a:schemeClr val="accent1"/>
+          </a:fillRef>
+          <a:effectRef idx="0">
+            <a:schemeClr val="accent1"/>
+          </a:effectRef>
+          <a:fontRef idx="minor">
+            <a:schemeClr val="lt1"/>
+          </a:fontRef>
+        </p:style>
+        <p:txBody>
+          <a:bodyPr rtlCol="0" anchor="ctr"/>
+          <a:lstStyle/>
+          <a:p>
+            <a:pPr algn="ctr"/>
+            <a:endParaRPr lang="en-SG" dirty="0"/>
+          </a:p>
+        </p:txBody>
+      </p:sp>
+      <p:sp>
+        <p:nvSpPr>
+          <p:cNvPr id="21" name="select_no"/>
+          <p:cNvSpPr/>
+          <p:nvPr/>
+        </p:nvSpPr>
+        <p:spPr>
+          <a:xfrm>
+            <a:off x="3791078" y="4724400"/>
+            <a:ext cx="1752600" cy="1371600"/>
+          </a:xfrm>
+          <a:prstGeom prst="noSmoking">
+            <a:avLst/>
+          </a:prstGeom>
+        </p:spPr>
+        <p:style>
+          <a:lnRef idx="2">
+            <a:schemeClr val="accent1">
+              <a:shade val="50000"/>
+            </a:schemeClr>
+          </a:lnRef>
+          <a:fillRef idx="1">
+            <a:schemeClr val="accent1"/>
+          </a:fillRef>
+          <a:effectRef idx="0">
+            <a:schemeClr val="accent1"/>
+          </a:effectRef>
+          <a:fontRef idx="minor">
+            <a:schemeClr val="lt1"/>
+          </a:fontRef>
+        </p:style>
+        <p:txBody>
+          <a:bodyPr rtlCol="0" anchor="ctr"/>
+          <a:lstStyle/>
+          <a:p>
+            <a:pPr algn="ctr"/>
+            <a:endParaRPr lang="en-SG">
+              <a:solidFill>
+                <a:schemeClr val="tx1"/>
+              </a:solidFill>
+            </a:endParaRPr>
+          </a:p>
+        </p:txBody>
+      </p:sp>
+      <p:sp>
+        <p:nvSpPr>
+          <p:cNvPr id="22" name="select_quadArrow"/>
+          <p:cNvSpPr/>
+          <p:nvPr/>
+        </p:nvSpPr>
+        <p:spPr>
+          <a:xfrm>
+            <a:off x="5791200" y="3377859"/>
+            <a:ext cx="1752600" cy="1519653"/>
+          </a:xfrm>
+          <a:prstGeom prst="quadArrow">
+            <a:avLst/>
+          </a:prstGeom>
+        </p:spPr>
+        <p:style>
+          <a:lnRef idx="2">
+            <a:schemeClr val="accent1">
+              <a:shade val="50000"/>
+            </a:schemeClr>
+          </a:lnRef>
+          <a:fillRef idx="1">
+            <a:schemeClr val="accent1"/>
+          </a:fillRef>
+          <a:effectRef idx="0">
+            <a:schemeClr val="accent1"/>
+          </a:effectRef>
+          <a:fontRef idx="minor">
+            <a:schemeClr val="lt1"/>
+          </a:fontRef>
+        </p:style>
+        <p:txBody>
+          <a:bodyPr rtlCol="0" anchor="ctr"/>
+          <a:lstStyle/>
+          <a:p>
+            <a:pPr algn="ctr"/>
+            <a:endParaRPr lang="en-SG"/>
+          </a:p>
+        </p:txBody>
+      </p:sp>
+      <p:sp>
+        <p:nvSpPr>
+          <p:cNvPr id="23" name="select_notEqual"/>
+          <p:cNvSpPr/>
+          <p:nvPr/>
+        </p:nvSpPr>
+        <p:spPr>
+          <a:xfrm>
+            <a:off x="3505200" y="2707274"/>
+            <a:ext cx="3048000" cy="1636126"/>
+          </a:xfrm>
+          <a:prstGeom prst="mathNotEqual">
+            <a:avLst/>
+          </a:prstGeom>
+        </p:spPr>
+        <p:style>
+          <a:lnRef idx="2">
+            <a:schemeClr val="accent1">
+              <a:shade val="50000"/>
+            </a:schemeClr>
+          </a:lnRef>
+          <a:fillRef idx="1">
+            <a:schemeClr val="accent1"/>
+          </a:fillRef>
+          <a:effectRef idx="0">
+            <a:schemeClr val="accent1"/>
+          </a:effectRef>
+          <a:fontRef idx="minor">
+            <a:schemeClr val="lt1"/>
+          </a:fontRef>
+        </p:style>
+        <p:txBody>
+          <a:bodyPr rtlCol="0" anchor="ctr"/>
+          <a:lstStyle/>
+          <a:p>
+            <a:pPr algn="ctr"/>
+            <a:endParaRPr lang="en-SG">
+              <a:solidFill>
+                <a:schemeClr val="tx1"/>
+              </a:solidFill>
+            </a:endParaRPr>
+          </a:p>
+        </p:txBody>
+      </p:sp>
+      <p:sp>
+        <p:nvSpPr>
+          <p:cNvPr id="24" name="select_explosion"/>
+          <p:cNvSpPr/>
+          <p:nvPr/>
+        </p:nvSpPr>
+        <p:spPr>
+          <a:xfrm>
+            <a:off x="914400" y="1371600"/>
+            <a:ext cx="1284149" cy="1524000"/>
+          </a:xfrm>
+          <a:prstGeom prst="irregularSeal2">
+            <a:avLst/>
+          </a:prstGeom>
+        </p:spPr>
+        <p:style>
+          <a:lnRef idx="2">
+            <a:schemeClr val="accent1">
+              <a:shade val="50000"/>
+            </a:schemeClr>
+          </a:lnRef>
+          <a:fillRef idx="1">
+            <a:schemeClr val="accent1"/>
+          </a:fillRef>
+          <a:effectRef idx="0">
+            <a:schemeClr val="accent1"/>
+          </a:effectRef>
+          <a:fontRef idx="minor">
+            <a:schemeClr val="lt1"/>
+          </a:fontRef>
+        </p:style>
+        <p:txBody>
+          <a:bodyPr rtlCol="0" anchor="ctr"/>
+          <a:lstStyle/>
+          <a:p>
+            <a:pPr algn="ctr"/>
+            <a:endParaRPr lang="en-SG"/>
+          </a:p>
+        </p:txBody>
+      </p:sp>
+      <p:sp>
+        <p:nvSpPr>
+          <p:cNvPr id="25" name="select_actionButton">
+            <a:hlinkClick r:id="" action="ppaction://hlinkshowjump?jump=lastslide" highlightClick="1"/>
+          </p:cNvPr>
+          <p:cNvSpPr/>
+          <p:nvPr/>
+        </p:nvSpPr>
+        <p:spPr>
+          <a:xfrm>
+            <a:off x="6553200" y="5676900"/>
+            <a:ext cx="1066800" cy="838200"/>
+          </a:xfrm>
+          <a:prstGeom prst="actionButtonEnd">
+            <a:avLst/>
+          </a:prstGeom>
+        </p:spPr>
+        <p:style>
+          <a:lnRef idx="2">
+            <a:schemeClr val="accent1">
+              <a:shade val="50000"/>
+            </a:schemeClr>
+          </a:lnRef>
+          <a:fillRef idx="1">
+            <a:schemeClr val="accent1"/>
+          </a:fillRef>
+          <a:effectRef idx="0">
+            <a:schemeClr val="accent1"/>
+          </a:effectRef>
+          <a:fontRef idx="minor">
+            <a:schemeClr val="lt1"/>
+          </a:fontRef>
+        </p:style>
+        <p:txBody>
+          <a:bodyPr rtlCol="0" anchor="ctr"/>
+          <a:lstStyle/>
+          <a:p>
+            <a:pPr algn="ctr"/>
+            <a:endParaRPr lang="en-SG"/>
+          </a:p>
+        </p:txBody>
+      </p:sp>
+      <p:sp>
+        <p:nvSpPr>
+          <p:cNvPr id="10" name="Rounded Rectangular Callout 9"/>
+          <p:cNvSpPr/>
+          <p:nvPr/>
+        </p:nvSpPr>
+        <p:spPr>
+          <a:xfrm>
+            <a:off x="2530469" y="1263650"/>
+            <a:ext cx="1905000" cy="1270000"/>
+          </a:xfrm>
+          <a:prstGeom prst="wedgeRoundRectCallout">
+            <a:avLst/>
+          </a:prstGeom>
+          <a:solidFill>
+            <a:srgbClr val="000000">
+              <a:alpha val="80000"/>
+            </a:srgbClr>
+          </a:solidFill>
+          <a:ln w="635">
+            <a:solidFill>
+              <a:srgbClr val="FFFF00"/>
+            </a:solidFill>
+          </a:ln>
+          <a:effectLst>
+            <a:outerShdw blurRad="63500" sx="102000" sy="102000" algn="ctr">
+              <a:prstClr val="black">
+                <a:alpha val="40000"/>
+              </a:prstClr>
+            </a:outerShdw>
+          </a:effectLst>
+        </p:spPr>
+        <p:style>
+          <a:lnRef idx="2">
+            <a:schemeClr val="accent1">
+              <a:shade val="50000"/>
+            </a:schemeClr>
+          </a:lnRef>
+          <a:fillRef idx="1">
+            <a:schemeClr val="accent1"/>
+          </a:fillRef>
+          <a:effectRef idx="0">
+            <a:schemeClr val="accent1"/>
+          </a:effectRef>
+          <a:fontRef idx="minor">
+            <a:schemeClr val="lt1"/>
+          </a:fontRef>
+        </p:style>
+        <p:txBody>
+          <a:bodyPr rtlCol="0" anchor="ctr">
+            <a:normAutofit/>
+          </a:bodyPr>
+          <a:lstStyle/>
+          <a:p>
+            <a:pPr algn="ctr"/>
+            <a:endParaRPr lang="en-SG" sz="1600">
+              <a:solidFill>
+                <a:srgbClr val="FFFFFF"/>
+              </a:solidFill>
+            </a:endParaRPr>
+          </a:p>
+        </p:txBody>
+      </p:sp>
+      <p:sp>
+        <p:nvSpPr>
+          <p:cNvPr id="11" name="Rounded Rectangular Callout 10"/>
+          <p:cNvSpPr/>
+          <p:nvPr/>
+        </p:nvSpPr>
+        <p:spPr>
+          <a:xfrm>
+            <a:off x="4016369" y="120650"/>
+            <a:ext cx="1905000" cy="1270000"/>
+          </a:xfrm>
+          <a:prstGeom prst="wedgeRoundRectCallout">
+            <a:avLst/>
+          </a:prstGeom>
+          <a:solidFill>
+            <a:srgbClr val="000000">
+              <a:alpha val="80000"/>
+            </a:srgbClr>
+          </a:solidFill>
+          <a:ln w="635">
+            <a:solidFill>
+              <a:srgbClr val="FFFF00"/>
+            </a:solidFill>
+          </a:ln>
+          <a:effectLst>
+            <a:outerShdw blurRad="63500" sx="102000" sy="102000" algn="ctr">
+              <a:prstClr val="black">
+                <a:alpha val="40000"/>
+              </a:prstClr>
+            </a:outerShdw>
+          </a:effectLst>
+        </p:spPr>
+        <p:style>
+          <a:lnRef idx="2">
+            <a:schemeClr val="accent1">
+              <a:shade val="50000"/>
+            </a:schemeClr>
+          </a:lnRef>
+          <a:fillRef idx="1">
+            <a:schemeClr val="accent1"/>
+          </a:fillRef>
+          <a:effectRef idx="0">
+            <a:schemeClr val="accent1"/>
+          </a:effectRef>
+          <a:fontRef idx="minor">
+            <a:schemeClr val="lt1"/>
+          </a:fontRef>
+        </p:style>
+        <p:txBody>
+          <a:bodyPr rtlCol="0" anchor="ctr">
+            <a:normAutofit/>
+          </a:bodyPr>
+          <a:lstStyle/>
+          <a:p>
+            <a:pPr algn="ctr"/>
+            <a:endParaRPr lang="en-SG" sz="1600">
+              <a:solidFill>
+                <a:srgbClr val="FFFFFF"/>
+              </a:solidFill>
+            </a:endParaRPr>
+          </a:p>
+        </p:txBody>
+      </p:sp>
+      <p:sp>
+        <p:nvSpPr>
+          <p:cNvPr id="12" name="Rounded Rectangular Callout 11"/>
+          <p:cNvSpPr/>
+          <p:nvPr/>
+        </p:nvSpPr>
+        <p:spPr>
+          <a:xfrm>
+            <a:off x="1642918" y="1492250"/>
+            <a:ext cx="1905000" cy="1270000"/>
+          </a:xfrm>
+          <a:prstGeom prst="wedgeRoundRectCallout">
+            <a:avLst/>
+          </a:prstGeom>
+          <a:solidFill>
+            <a:srgbClr val="000000">
+              <a:alpha val="80000"/>
+            </a:srgbClr>
+          </a:solidFill>
+          <a:ln w="635">
+            <a:solidFill>
+              <a:srgbClr val="FFFF00"/>
+            </a:solidFill>
+          </a:ln>
+          <a:effectLst>
+            <a:outerShdw blurRad="63500" sx="102000" sy="102000" algn="ctr">
+              <a:prstClr val="black">
+                <a:alpha val="40000"/>
+              </a:prstClr>
+            </a:outerShdw>
+          </a:effectLst>
+        </p:spPr>
+        <p:style>
+          <a:lnRef idx="2">
+            <a:schemeClr val="accent1">
+              <a:shade val="50000"/>
+            </a:schemeClr>
+          </a:lnRef>
+          <a:fillRef idx="1">
+            <a:schemeClr val="accent1"/>
+          </a:fillRef>
+          <a:effectRef idx="0">
+            <a:schemeClr val="accent1"/>
+          </a:effectRef>
+          <a:fontRef idx="minor">
+            <a:schemeClr val="lt1"/>
+          </a:fontRef>
+        </p:style>
+        <p:txBody>
+          <a:bodyPr rtlCol="0" anchor="ctr">
+            <a:normAutofit/>
+          </a:bodyPr>
+          <a:lstStyle/>
+          <a:p>
+            <a:pPr algn="ctr"/>
+            <a:endParaRPr lang="en-SG" sz="1600">
+              <a:solidFill>
+                <a:srgbClr val="FFFFFF"/>
+              </a:solidFill>
+            </a:endParaRPr>
+          </a:p>
+        </p:txBody>
+      </p:sp>
+      <p:sp>
+        <p:nvSpPr>
+          <p:cNvPr id="13" name="Rounded Rectangular Callout 12"/>
+          <p:cNvSpPr/>
+          <p:nvPr/>
+        </p:nvSpPr>
+        <p:spPr>
+          <a:xfrm>
+            <a:off x="4111747" y="3168650"/>
+            <a:ext cx="1905000" cy="1270000"/>
+          </a:xfrm>
+          <a:prstGeom prst="wedgeRoundRectCallout">
+            <a:avLst/>
+          </a:prstGeom>
+          <a:solidFill>
+            <a:srgbClr val="000000">
+              <a:alpha val="80000"/>
+            </a:srgbClr>
+          </a:solidFill>
+          <a:ln w="635">
+            <a:solidFill>
+              <a:srgbClr val="FFFF00"/>
+            </a:solidFill>
+          </a:ln>
+          <a:effectLst>
+            <a:outerShdw blurRad="63500" sx="102000" sy="102000" algn="ctr">
+              <a:prstClr val="black">
+                <a:alpha val="40000"/>
+              </a:prstClr>
+            </a:outerShdw>
+          </a:effectLst>
+        </p:spPr>
+        <p:style>
+          <a:lnRef idx="2">
+            <a:schemeClr val="accent1">
+              <a:shade val="50000"/>
+            </a:schemeClr>
+          </a:lnRef>
+          <a:fillRef idx="1">
+            <a:schemeClr val="accent1"/>
+          </a:fillRef>
+          <a:effectRef idx="0">
+            <a:schemeClr val="accent1"/>
+          </a:effectRef>
+          <a:fontRef idx="minor">
+            <a:schemeClr val="lt1"/>
+          </a:fontRef>
+        </p:style>
+        <p:txBody>
+          <a:bodyPr rtlCol="0" anchor="ctr">
+            <a:normAutofit/>
+          </a:bodyPr>
+          <a:lstStyle/>
+          <a:p>
+            <a:pPr algn="ctr"/>
+            <a:endParaRPr lang="en-SG" sz="1600">
+              <a:solidFill>
+                <a:srgbClr val="FFFFFF"/>
+              </a:solidFill>
+            </a:endParaRPr>
+          </a:p>
+        </p:txBody>
+      </p:sp>
+      <p:sp>
+        <p:nvSpPr>
+          <p:cNvPr id="14" name="Rounded Rectangular Callout 13"/>
+          <p:cNvSpPr/>
+          <p:nvPr/>
+        </p:nvSpPr>
+        <p:spPr>
+          <a:xfrm>
+            <a:off x="6111869" y="1822109"/>
+            <a:ext cx="1905000" cy="1270000"/>
+          </a:xfrm>
+          <a:prstGeom prst="wedgeRoundRectCallout">
+            <a:avLst/>
+          </a:prstGeom>
+          <a:solidFill>
+            <a:srgbClr val="000000">
+              <a:alpha val="80000"/>
+            </a:srgbClr>
+          </a:solidFill>
+          <a:ln w="635">
+            <a:solidFill>
+              <a:srgbClr val="FFFF00"/>
+            </a:solidFill>
+          </a:ln>
+          <a:effectLst>
+            <a:outerShdw blurRad="63500" sx="102000" sy="102000" algn="ctr">
+              <a:prstClr val="black">
+                <a:alpha val="40000"/>
+              </a:prstClr>
+            </a:outerShdw>
+          </a:effectLst>
+        </p:spPr>
+        <p:style>
+          <a:lnRef idx="2">
+            <a:schemeClr val="accent1">
+              <a:shade val="50000"/>
+            </a:schemeClr>
+          </a:lnRef>
+          <a:fillRef idx="1">
+            <a:schemeClr val="accent1"/>
+          </a:fillRef>
+          <a:effectRef idx="0">
+            <a:schemeClr val="accent1"/>
+          </a:effectRef>
+          <a:fontRef idx="minor">
+            <a:schemeClr val="lt1"/>
+          </a:fontRef>
+        </p:style>
+        <p:txBody>
+          <a:bodyPr rtlCol="0" anchor="ctr">
+            <a:normAutofit/>
+          </a:bodyPr>
+          <a:lstStyle/>
+          <a:p>
+            <a:pPr algn="ctr"/>
+            <a:endParaRPr lang="en-SG" sz="1600">
+              <a:solidFill>
+                <a:srgbClr val="FFFFFF"/>
+              </a:solidFill>
+            </a:endParaRPr>
+          </a:p>
+        </p:txBody>
+      </p:sp>
+      <p:sp>
+        <p:nvSpPr>
+          <p:cNvPr id="15" name="Rounded Rectangular Callout 14"/>
+          <p:cNvSpPr/>
+          <p:nvPr/>
+        </p:nvSpPr>
+        <p:spPr>
+          <a:xfrm>
+            <a:off x="4473569" y="1151524"/>
+            <a:ext cx="1905000" cy="1270000"/>
+          </a:xfrm>
+          <a:prstGeom prst="wedgeRoundRectCallout">
+            <a:avLst/>
+          </a:prstGeom>
+          <a:solidFill>
+            <a:srgbClr val="000000">
+              <a:alpha val="80000"/>
+            </a:srgbClr>
+          </a:solidFill>
+          <a:ln w="635">
+            <a:solidFill>
+              <a:srgbClr val="FFFF00"/>
+            </a:solidFill>
+          </a:ln>
+          <a:effectLst>
+            <a:outerShdw blurRad="63500" sx="102000" sy="102000" algn="ctr">
+              <a:prstClr val="black">
+                <a:alpha val="40000"/>
+              </a:prstClr>
+            </a:outerShdw>
+          </a:effectLst>
+        </p:spPr>
+        <p:style>
+          <a:lnRef idx="2">
+            <a:schemeClr val="accent1">
+              <a:shade val="50000"/>
+            </a:schemeClr>
+          </a:lnRef>
+          <a:fillRef idx="1">
+            <a:schemeClr val="accent1"/>
+          </a:fillRef>
+          <a:effectRef idx="0">
+            <a:schemeClr val="accent1"/>
+          </a:effectRef>
+          <a:fontRef idx="minor">
+            <a:schemeClr val="lt1"/>
+          </a:fontRef>
+        </p:style>
+        <p:txBody>
+          <a:bodyPr rtlCol="0" anchor="ctr">
+            <a:normAutofit/>
+          </a:bodyPr>
+          <a:lstStyle/>
+          <a:p>
+            <a:pPr algn="ctr"/>
+            <a:endParaRPr lang="en-SG" sz="1600">
+              <a:solidFill>
+                <a:srgbClr val="FFFFFF"/>
+              </a:solidFill>
+            </a:endParaRPr>
+          </a:p>
+        </p:txBody>
+      </p:sp>
+      <p:sp>
+        <p:nvSpPr>
+          <p:cNvPr id="16" name="Rounded Rectangular Callout 15"/>
+          <p:cNvSpPr/>
+          <p:nvPr/>
+        </p:nvSpPr>
+        <p:spPr>
+          <a:xfrm>
+            <a:off x="1000843" y="-184150"/>
+            <a:ext cx="1905000" cy="1270000"/>
+          </a:xfrm>
+          <a:prstGeom prst="wedgeRoundRectCallout">
+            <a:avLst/>
+          </a:prstGeom>
+          <a:solidFill>
+            <a:srgbClr val="000000">
+              <a:alpha val="80000"/>
+            </a:srgbClr>
+          </a:solidFill>
+          <a:ln w="635">
+            <a:solidFill>
+              <a:srgbClr val="FFFF00"/>
+            </a:solidFill>
+          </a:ln>
+          <a:effectLst>
+            <a:outerShdw blurRad="63500" sx="102000" sy="102000" algn="ctr">
+              <a:prstClr val="black">
+                <a:alpha val="40000"/>
+              </a:prstClr>
+            </a:outerShdw>
+          </a:effectLst>
+        </p:spPr>
+        <p:style>
+          <a:lnRef idx="2">
+            <a:schemeClr val="accent1">
+              <a:shade val="50000"/>
+            </a:schemeClr>
+          </a:lnRef>
+          <a:fillRef idx="1">
+            <a:schemeClr val="accent1"/>
+          </a:fillRef>
+          <a:effectRef idx="0">
+            <a:schemeClr val="accent1"/>
+          </a:effectRef>
+          <a:fontRef idx="minor">
+            <a:schemeClr val="lt1"/>
+          </a:fontRef>
+        </p:style>
+        <p:txBody>
+          <a:bodyPr rtlCol="0" anchor="ctr">
+            <a:normAutofit/>
+          </a:bodyPr>
+          <a:lstStyle/>
+          <a:p>
+            <a:pPr algn="ctr"/>
+            <a:endParaRPr lang="en-SG" sz="1600">
+              <a:solidFill>
+                <a:srgbClr val="FFFFFF"/>
+              </a:solidFill>
+            </a:endParaRPr>
+          </a:p>
+        </p:txBody>
+      </p:sp>
+      <p:sp>
+        <p:nvSpPr>
+          <p:cNvPr id="18" name="Rounded Rectangular Callout 17"/>
+          <p:cNvSpPr/>
+          <p:nvPr/>
+        </p:nvSpPr>
+        <p:spPr>
+          <a:xfrm>
+            <a:off x="6530969" y="4121150"/>
+            <a:ext cx="1905000" cy="1270000"/>
+          </a:xfrm>
+          <a:prstGeom prst="wedgeRoundRectCallout">
+            <a:avLst/>
+          </a:prstGeom>
+          <a:solidFill>
+            <a:srgbClr val="000000">
+              <a:alpha val="80000"/>
+            </a:srgbClr>
+          </a:solidFill>
+          <a:ln w="635">
+            <a:solidFill>
+              <a:srgbClr val="FFFF00"/>
+            </a:solidFill>
+          </a:ln>
+          <a:effectLst>
+            <a:outerShdw blurRad="63500" sx="102000" sy="102000" algn="ctr">
+              <a:prstClr val="black">
+                <a:alpha val="40000"/>
+              </a:prstClr>
+            </a:outerShdw>
+          </a:effectLst>
+        </p:spPr>
+        <p:style>
+          <a:lnRef idx="2">
+            <a:schemeClr val="accent1">
+              <a:shade val="50000"/>
+            </a:schemeClr>
+          </a:lnRef>
+          <a:fillRef idx="1">
+            <a:schemeClr val="accent1"/>
+          </a:fillRef>
+          <a:effectRef idx="0">
+            <a:schemeClr val="accent1"/>
+          </a:effectRef>
+          <a:fontRef idx="minor">
+            <a:schemeClr val="lt1"/>
+          </a:fontRef>
+        </p:style>
+        <p:txBody>
+          <a:bodyPr rtlCol="0" anchor="ctr">
+            <a:normAutofit/>
+          </a:bodyPr>
+          <a:lstStyle/>
+          <a:p>
+            <a:pPr algn="ctr"/>
+            <a:endParaRPr lang="en-SG" sz="1600">
+              <a:solidFill>
+                <a:srgbClr val="FFFFFF"/>
+              </a:solidFill>
+            </a:endParaRPr>
+          </a:p>
+        </p:txBody>
+      </p:sp>
+    </p:spTree>
+    <p:extLst>
+      <p:ext uri="{BB962C8B-B14F-4D97-AF65-F5344CB8AC3E}">
+        <p14:creationId xmlns:p14="http://schemas.microsoft.com/office/powerpoint/2010/main" val="3719736973"/>
+      </p:ext>
+    </p:extLst>
+  </p:cSld>
+  <p:clrMapOvr>
+    <a:masterClrMapping/>
+  </p:clrMapOvr>
+  <p:timing>
+    <p:tnLst>
+      <p:par>
+        <p:cTn id="1" dur="indefinite" restart="never" nodeType="tmRoot">
+          <p:childTnLst>
+            <p:seq concurrent="1" nextAc="seek">
+              <p:cTn id="2" restart="whenNotActive" fill="hold" evtFilter="cancelBubble" nodeType="interactiveSeq">
+                <p:stCondLst>
+                  <p:cond evt="onClick" delay="0">
+                    <p:tgtEl>
+                      <p:spTgt spid="17"/>
+                    </p:tgtEl>
+                  </p:cond>
+                </p:stCondLst>
+                <p:endSync evt="end" delay="0">
+                  <p:rtn val="all"/>
+                </p:endSync>
+                <p:childTnLst>
+                  <p:par>
+                    <p:cTn id="3" fill="hold">
+                      <p:stCondLst>
+                        <p:cond delay="0"/>
+                      </p:stCondLst>
+                      <p:childTnLst>
+                        <p:par>
+                          <p:cTn id="4" fill="hold">
+                            <p:stCondLst>
+                              <p:cond delay="0"/>
+                            </p:stCondLst>
+                            <p:childTnLst>
+                              <p:par>
+                                <p:cTn id="5" presetID="10" presetClass="entr" presetSubtype="0" fill="hold" grpId="0" nodeType="clickEffect">
+                                  <p:stCondLst>
+                                    <p:cond delay="0"/>
+                                  </p:stCondLst>
+                                  <p:childTnLst>
+                                    <p:set>
+                                      <p:cBhvr>
+                                        <p:cTn id="6" dur="1" fill="hold">
+                                          <p:stCondLst>
+                                            <p:cond delay="0"/>
+                                          </p:stCondLst>
+                                        </p:cTn>
+                                        <p:tgtEl>
+                                          <p:spTgt spid="10"/>
+                                        </p:tgtEl>
+                                        <p:attrNameLst>
+                                          <p:attrName>style.visibility</p:attrName>
+                                        </p:attrNameLst>
+                                      </p:cBhvr>
+                                      <p:to>
+                                        <p:strVal val="visible"/>
+                                      </p:to>
+                                    </p:set>
+                                    <p:animEffect transition="in" filter="fade">
+                                      <p:cBhvr>
+                                        <p:cTn id="7" dur="500"/>
+                                        <p:tgtEl>
+                                          <p:spTgt spid="10"/>
+                                        </p:tgtEl>
+                                      </p:cBhvr>
+                                    </p:animEffect>
+                                  </p:childTnLst>
+                                </p:cTn>
+                              </p:par>
+                            </p:childTnLst>
+                          </p:cTn>
+                        </p:par>
+                      </p:childTnLst>
+                    </p:cTn>
+                  </p:par>
+                  <p:par>
+                    <p:cTn id="8" fill="hold">
+                      <p:stCondLst>
+                        <p:cond delay="indefinite"/>
+                      </p:stCondLst>
+                      <p:childTnLst>
+                        <p:par>
+                          <p:cTn id="9" fill="hold">
+                            <p:stCondLst>
+                              <p:cond delay="0"/>
+                            </p:stCondLst>
+                            <p:childTnLst>
+                              <p:par>
+                                <p:cTn id="10" presetID="10" presetClass="exit" presetSubtype="0" fill="hold" grpId="1" nodeType="clickEffect">
+                                  <p:stCondLst>
+                                    <p:cond delay="0"/>
+                                  </p:stCondLst>
+                                  <p:childTnLst>
+                                    <p:animEffect transition="out" filter="fade">
+                                      <p:cBhvr>
+                                        <p:cTn id="11" dur="500"/>
+                                        <p:tgtEl>
+                                          <p:spTgt spid="10"/>
+                                        </p:tgtEl>
+                                      </p:cBhvr>
+                                    </p:animEffect>
+                                    <p:set>
+                                      <p:cBhvr>
+                                        <p:cTn id="12" dur="1" fill="hold">
+                                          <p:stCondLst>
+                                            <p:cond delay="499"/>
+                                          </p:stCondLst>
+                                        </p:cTn>
+                                        <p:tgtEl>
+                                          <p:spTgt spid="10"/>
+                                        </p:tgtEl>
+                                        <p:attrNameLst>
+                                          <p:attrName>style.visibility</p:attrName>
+                                        </p:attrNameLst>
+                                      </p:cBhvr>
+                                      <p:to>
+                                        <p:strVal val="hidden"/>
+                                      </p:to>
+                                    </p:set>
+                                  </p:childTnLst>
+                                </p:cTn>
+                              </p:par>
+                            </p:childTnLst>
+                          </p:cTn>
+                        </p:par>
+                      </p:childTnLst>
+                    </p:cTn>
+                  </p:par>
+                </p:childTnLst>
+              </p:cTn>
+              <p:nextCondLst>
+                <p:cond evt="onClick" delay="0">
+                  <p:tgtEl>
+                    <p:spTgt spid="17"/>
+                  </p:tgtEl>
+                </p:cond>
+              </p:nextCondLst>
+            </p:seq>
+            <p:seq concurrent="1" nextAc="seek">
+              <p:cTn id="13" restart="whenNotActive" fill="hold" evtFilter="cancelBubble" nodeType="interactiveSeq">
+                <p:stCondLst>
+                  <p:cond evt="onClick" delay="0">
+                    <p:tgtEl>
+                      <p:spTgt spid="19"/>
+                    </p:tgtEl>
+                  </p:cond>
+                </p:stCondLst>
+                <p:endSync evt="end" delay="0">
+                  <p:rtn val="all"/>
+                </p:endSync>
+                <p:childTnLst>
+                  <p:par>
+                    <p:cTn id="14" fill="hold">
+                      <p:stCondLst>
+                        <p:cond delay="0"/>
+                      </p:stCondLst>
+                      <p:childTnLst>
+                        <p:par>
+                          <p:cTn id="15" fill="hold">
+                            <p:stCondLst>
+                              <p:cond delay="0"/>
+                            </p:stCondLst>
+                            <p:childTnLst>
+                              <p:par>
+                                <p:cTn id="16" presetID="10" presetClass="entr" presetSubtype="0" fill="hold" grpId="0" nodeType="clickEffect">
+                                  <p:stCondLst>
+                                    <p:cond delay="0"/>
+                                  </p:stCondLst>
+                                  <p:childTnLst>
+                                    <p:set>
+                                      <p:cBhvr>
+                                        <p:cTn id="17" dur="1" fill="hold">
+                                          <p:stCondLst>
+                                            <p:cond delay="0"/>
+                                          </p:stCondLst>
+                                        </p:cTn>
+                                        <p:tgtEl>
+                                          <p:spTgt spid="11"/>
+                                        </p:tgtEl>
+                                        <p:attrNameLst>
+                                          <p:attrName>style.visibility</p:attrName>
+                                        </p:attrNameLst>
+                                      </p:cBhvr>
+                                      <p:to>
+                                        <p:strVal val="visible"/>
+                                      </p:to>
+                                    </p:set>
+                                    <p:animEffect transition="in" filter="fade">
+                                      <p:cBhvr>
+                                        <p:cTn id="18" dur="500"/>
+                                        <p:tgtEl>
+                                          <p:spTgt spid="11"/>
+                                        </p:tgtEl>
+                                      </p:cBhvr>
+                                    </p:animEffect>
+                                  </p:childTnLst>
+                                </p:cTn>
+                              </p:par>
+                            </p:childTnLst>
+                          </p:cTn>
+                        </p:par>
+                      </p:childTnLst>
+                    </p:cTn>
+                  </p:par>
+                  <p:par>
+                    <p:cTn id="19" fill="hold">
+                      <p:stCondLst>
+                        <p:cond delay="indefinite"/>
+                      </p:stCondLst>
+                      <p:childTnLst>
+                        <p:par>
+                          <p:cTn id="20" fill="hold">
+                            <p:stCondLst>
+                              <p:cond delay="0"/>
+                            </p:stCondLst>
+                            <p:childTnLst>
+                              <p:par>
+                                <p:cTn id="21" presetID="10" presetClass="exit" presetSubtype="0" fill="hold" grpId="1" nodeType="clickEffect">
+                                  <p:stCondLst>
+                                    <p:cond delay="0"/>
+                                  </p:stCondLst>
+                                  <p:childTnLst>
+                                    <p:animEffect transition="out" filter="fade">
+                                      <p:cBhvr>
+                                        <p:cTn id="22" dur="500"/>
+                                        <p:tgtEl>
+                                          <p:spTgt spid="11"/>
+                                        </p:tgtEl>
+                                      </p:cBhvr>
+                                    </p:animEffect>
+                                    <p:set>
+                                      <p:cBhvr>
+                                        <p:cTn id="23" dur="1" fill="hold">
+                                          <p:stCondLst>
+                                            <p:cond delay="499"/>
+                                          </p:stCondLst>
+                                        </p:cTn>
+                                        <p:tgtEl>
+                                          <p:spTgt spid="11"/>
+                                        </p:tgtEl>
+                                        <p:attrNameLst>
+                                          <p:attrName>style.visibility</p:attrName>
+                                        </p:attrNameLst>
+                                      </p:cBhvr>
+                                      <p:to>
+                                        <p:strVal val="hidden"/>
+                                      </p:to>
+                                    </p:set>
+                                  </p:childTnLst>
+                                </p:cTn>
+                              </p:par>
+                            </p:childTnLst>
+                          </p:cTn>
+                        </p:par>
+                      </p:childTnLst>
+                    </p:cTn>
+                  </p:par>
+                </p:childTnLst>
+              </p:cTn>
+              <p:nextCondLst>
+                <p:cond evt="onClick" delay="0">
+                  <p:tgtEl>
+                    <p:spTgt spid="19"/>
+                  </p:tgtEl>
+                </p:cond>
+              </p:nextCondLst>
+            </p:seq>
+            <p:seq concurrent="1" nextAc="seek">
+              <p:cTn id="24" restart="whenNotActive" fill="hold" evtFilter="cancelBubble" nodeType="interactiveSeq">
+                <p:stCondLst>
+                  <p:cond evt="onClick" delay="0">
+                    <p:tgtEl>
+                      <p:spTgt spid="20"/>
+                    </p:tgtEl>
+                  </p:cond>
+                </p:stCondLst>
+                <p:endSync evt="end" delay="0">
+                  <p:rtn val="all"/>
+                </p:endSync>
+                <p:childTnLst>
+                  <p:par>
+                    <p:cTn id="25" fill="hold">
+                      <p:stCondLst>
+                        <p:cond delay="0"/>
+                      </p:stCondLst>
+                      <p:childTnLst>
+                        <p:par>
+                          <p:cTn id="26" fill="hold">
+                            <p:stCondLst>
+                              <p:cond delay="0"/>
+                            </p:stCondLst>
+                            <p:childTnLst>
+                              <p:par>
+                                <p:cTn id="27" presetID="10" presetClass="entr" presetSubtype="0" fill="hold" grpId="0" nodeType="clickEffect">
+                                  <p:stCondLst>
+                                    <p:cond delay="0"/>
+                                  </p:stCondLst>
+                                  <p:childTnLst>
+                                    <p:set>
+                                      <p:cBhvr>
+                                        <p:cTn id="28" dur="1" fill="hold">
+                                          <p:stCondLst>
+                                            <p:cond delay="0"/>
+                                          </p:stCondLst>
+                                        </p:cTn>
+                                        <p:tgtEl>
+                                          <p:spTgt spid="12"/>
+                                        </p:tgtEl>
+                                        <p:attrNameLst>
+                                          <p:attrName>style.visibility</p:attrName>
+                                        </p:attrNameLst>
+                                      </p:cBhvr>
+                                      <p:to>
+                                        <p:strVal val="visible"/>
+                                      </p:to>
+                                    </p:set>
+                                    <p:animEffect transition="in" filter="fade">
+                                      <p:cBhvr>
+                                        <p:cTn id="29" dur="500"/>
+                                        <p:tgtEl>
+                                          <p:spTgt spid="12"/>
+                                        </p:tgtEl>
+                                      </p:cBhvr>
+                                    </p:animEffect>
+                                  </p:childTnLst>
+                                </p:cTn>
+                              </p:par>
+                            </p:childTnLst>
+                          </p:cTn>
+                        </p:par>
+                      </p:childTnLst>
+                    </p:cTn>
+                  </p:par>
+                  <p:par>
+                    <p:cTn id="30" fill="hold">
+                      <p:stCondLst>
+                        <p:cond delay="indefinite"/>
+                      </p:stCondLst>
+                      <p:childTnLst>
+                        <p:par>
+                          <p:cTn id="31" fill="hold">
+                            <p:stCondLst>
+                              <p:cond delay="0"/>
+                            </p:stCondLst>
+                            <p:childTnLst>
+                              <p:par>
+                                <p:cTn id="32" presetID="10" presetClass="exit" presetSubtype="0" fill="hold" grpId="1" nodeType="clickEffect">
+                                  <p:stCondLst>
+                                    <p:cond delay="0"/>
+                                  </p:stCondLst>
+                                  <p:childTnLst>
+                                    <p:animEffect transition="out" filter="fade">
+                                      <p:cBhvr>
+                                        <p:cTn id="33" dur="500"/>
+                                        <p:tgtEl>
+                                          <p:spTgt spid="12"/>
+                                        </p:tgtEl>
+                                      </p:cBhvr>
+                                    </p:animEffect>
+                                    <p:set>
+                                      <p:cBhvr>
+                                        <p:cTn id="34" dur="1" fill="hold">
+                                          <p:stCondLst>
+                                            <p:cond delay="499"/>
+                                          </p:stCondLst>
+                                        </p:cTn>
+                                        <p:tgtEl>
+                                          <p:spTgt spid="12"/>
+                                        </p:tgtEl>
+                                        <p:attrNameLst>
+                                          <p:attrName>style.visibility</p:attrName>
+                                        </p:attrNameLst>
+                                      </p:cBhvr>
+                                      <p:to>
+                                        <p:strVal val="hidden"/>
+                                      </p:to>
+                                    </p:set>
+                                  </p:childTnLst>
+                                </p:cTn>
+                              </p:par>
+                            </p:childTnLst>
+                          </p:cTn>
+                        </p:par>
+                      </p:childTnLst>
+                    </p:cTn>
+                  </p:par>
+                </p:childTnLst>
+              </p:cTn>
+              <p:nextCondLst>
+                <p:cond evt="onClick" delay="0">
+                  <p:tgtEl>
+                    <p:spTgt spid="20"/>
+                  </p:tgtEl>
+                </p:cond>
+              </p:nextCondLst>
+            </p:seq>
+            <p:seq concurrent="1" nextAc="seek">
+              <p:cTn id="35" restart="whenNotActive" fill="hold" evtFilter="cancelBubble" nodeType="interactiveSeq">
+                <p:stCondLst>
+                  <p:cond evt="onClick" delay="0">
+                    <p:tgtEl>
+                      <p:spTgt spid="21"/>
+                    </p:tgtEl>
+                  </p:cond>
+                </p:stCondLst>
+                <p:endSync evt="end" delay="0">
+                  <p:rtn val="all"/>
+                </p:endSync>
+                <p:childTnLst>
+                  <p:par>
+                    <p:cTn id="36" fill="hold">
+                      <p:stCondLst>
+                        <p:cond delay="0"/>
+                      </p:stCondLst>
+                      <p:childTnLst>
+                        <p:par>
+                          <p:cTn id="37" fill="hold">
+                            <p:stCondLst>
+                              <p:cond delay="0"/>
+                            </p:stCondLst>
+                            <p:childTnLst>
+                              <p:par>
+                                <p:cTn id="38" presetID="10" presetClass="entr" presetSubtype="0" fill="hold" grpId="0" nodeType="clickEffect">
+                                  <p:stCondLst>
+                                    <p:cond delay="0"/>
+                                  </p:stCondLst>
+                                  <p:childTnLst>
+                                    <p:set>
+                                      <p:cBhvr>
+                                        <p:cTn id="39" dur="1" fill="hold">
+                                          <p:stCondLst>
+                                            <p:cond delay="0"/>
+                                          </p:stCondLst>
+                                        </p:cTn>
+                                        <p:tgtEl>
+                                          <p:spTgt spid="13"/>
+                                        </p:tgtEl>
+                                        <p:attrNameLst>
+                                          <p:attrName>style.visibility</p:attrName>
+                                        </p:attrNameLst>
+                                      </p:cBhvr>
+                                      <p:to>
+                                        <p:strVal val="visible"/>
+                                      </p:to>
+                                    </p:set>
+                                    <p:animEffect transition="in" filter="fade">
+                                      <p:cBhvr>
+                                        <p:cTn id="40" dur="500"/>
+                                        <p:tgtEl>
+                                          <p:spTgt spid="13"/>
+                                        </p:tgtEl>
+                                      </p:cBhvr>
+                                    </p:animEffect>
+                                  </p:childTnLst>
+                                </p:cTn>
+                              </p:par>
+                            </p:childTnLst>
+                          </p:cTn>
+                        </p:par>
+                      </p:childTnLst>
+                    </p:cTn>
+                  </p:par>
+                  <p:par>
+                    <p:cTn id="41" fill="hold">
+                      <p:stCondLst>
+                        <p:cond delay="indefinite"/>
+                      </p:stCondLst>
+                      <p:childTnLst>
+                        <p:par>
+                          <p:cTn id="42" fill="hold">
+                            <p:stCondLst>
+                              <p:cond delay="0"/>
+                            </p:stCondLst>
+                            <p:childTnLst>
+                              <p:par>
+                                <p:cTn id="43" presetID="10" presetClass="exit" presetSubtype="0" fill="hold" grpId="1" nodeType="clickEffect">
+                                  <p:stCondLst>
+                                    <p:cond delay="0"/>
+                                  </p:stCondLst>
+                                  <p:childTnLst>
+                                    <p:animEffect transition="out" filter="fade">
+                                      <p:cBhvr>
+                                        <p:cTn id="44" dur="500"/>
+                                        <p:tgtEl>
+                                          <p:spTgt spid="13"/>
+                                        </p:tgtEl>
+                                      </p:cBhvr>
+                                    </p:animEffect>
+                                    <p:set>
+                                      <p:cBhvr>
+                                        <p:cTn id="45" dur="1" fill="hold">
+                                          <p:stCondLst>
+                                            <p:cond delay="499"/>
+                                          </p:stCondLst>
+                                        </p:cTn>
+                                        <p:tgtEl>
+                                          <p:spTgt spid="13"/>
+                                        </p:tgtEl>
+                                        <p:attrNameLst>
+                                          <p:attrName>style.visibility</p:attrName>
+                                        </p:attrNameLst>
+                                      </p:cBhvr>
+                                      <p:to>
+                                        <p:strVal val="hidden"/>
+                                      </p:to>
+                                    </p:set>
+                                  </p:childTnLst>
+                                </p:cTn>
+                              </p:par>
+                            </p:childTnLst>
+                          </p:cTn>
+                        </p:par>
+                      </p:childTnLst>
+                    </p:cTn>
+                  </p:par>
+                </p:childTnLst>
+              </p:cTn>
+              <p:nextCondLst>
+                <p:cond evt="onClick" delay="0">
+                  <p:tgtEl>
+                    <p:spTgt spid="21"/>
+                  </p:tgtEl>
+                </p:cond>
+              </p:nextCondLst>
+            </p:seq>
+            <p:seq concurrent="1" nextAc="seek">
+              <p:cTn id="46" restart="whenNotActive" fill="hold" evtFilter="cancelBubble" nodeType="interactiveSeq">
+                <p:stCondLst>
+                  <p:cond evt="onClick" delay="0">
+                    <p:tgtEl>
+                      <p:spTgt spid="22"/>
+                    </p:tgtEl>
+                  </p:cond>
+                </p:stCondLst>
+                <p:endSync evt="end" delay="0">
+                  <p:rtn val="all"/>
+                </p:endSync>
+                <p:childTnLst>
+                  <p:par>
+                    <p:cTn id="47" fill="hold">
+                      <p:stCondLst>
+                        <p:cond delay="0"/>
+                      </p:stCondLst>
+                      <p:childTnLst>
+                        <p:par>
+                          <p:cTn id="48" fill="hold">
+                            <p:stCondLst>
+                              <p:cond delay="0"/>
+                            </p:stCondLst>
+                            <p:childTnLst>
+                              <p:par>
+                                <p:cTn id="49" presetID="10" presetClass="entr" presetSubtype="0" fill="hold" grpId="0" nodeType="clickEffect">
+                                  <p:stCondLst>
+                                    <p:cond delay="0"/>
+                                  </p:stCondLst>
+                                  <p:childTnLst>
+                                    <p:set>
+                                      <p:cBhvr>
+                                        <p:cTn id="50" dur="1" fill="hold">
+                                          <p:stCondLst>
+                                            <p:cond delay="0"/>
+                                          </p:stCondLst>
+                                        </p:cTn>
+                                        <p:tgtEl>
+                                          <p:spTgt spid="14"/>
+                                        </p:tgtEl>
+                                        <p:attrNameLst>
+                                          <p:attrName>style.visibility</p:attrName>
+                                        </p:attrNameLst>
+                                      </p:cBhvr>
+                                      <p:to>
+                                        <p:strVal val="visible"/>
+                                      </p:to>
+                                    </p:set>
+                                    <p:animEffect transition="in" filter="fade">
+                                      <p:cBhvr>
+                                        <p:cTn id="51" dur="500"/>
+                                        <p:tgtEl>
+                                          <p:spTgt spid="14"/>
+                                        </p:tgtEl>
+                                      </p:cBhvr>
+                                    </p:animEffect>
+                                  </p:childTnLst>
+                                </p:cTn>
+                              </p:par>
+                            </p:childTnLst>
+                          </p:cTn>
+                        </p:par>
+                      </p:childTnLst>
+                    </p:cTn>
+                  </p:par>
+                  <p:par>
+                    <p:cTn id="52" fill="hold">
+                      <p:stCondLst>
+                        <p:cond delay="indefinite"/>
+                      </p:stCondLst>
+                      <p:childTnLst>
+                        <p:par>
+                          <p:cTn id="53" fill="hold">
+                            <p:stCondLst>
+                              <p:cond delay="0"/>
+                            </p:stCondLst>
+                            <p:childTnLst>
+                              <p:par>
+                                <p:cTn id="54" presetID="10" presetClass="exit" presetSubtype="0" fill="hold" grpId="1" nodeType="clickEffect">
+                                  <p:stCondLst>
+                                    <p:cond delay="0"/>
+                                  </p:stCondLst>
+                                  <p:childTnLst>
+                                    <p:animEffect transition="out" filter="fade">
+                                      <p:cBhvr>
+                                        <p:cTn id="55" dur="500"/>
+                                        <p:tgtEl>
+                                          <p:spTgt spid="14"/>
+                                        </p:tgtEl>
+                                      </p:cBhvr>
+                                    </p:animEffect>
+                                    <p:set>
+                                      <p:cBhvr>
+                                        <p:cTn id="56" dur="1" fill="hold">
+                                          <p:stCondLst>
+                                            <p:cond delay="499"/>
+                                          </p:stCondLst>
+                                        </p:cTn>
+                                        <p:tgtEl>
+                                          <p:spTgt spid="14"/>
+                                        </p:tgtEl>
+                                        <p:attrNameLst>
+                                          <p:attrName>style.visibility</p:attrName>
+                                        </p:attrNameLst>
+                                      </p:cBhvr>
+                                      <p:to>
+                                        <p:strVal val="hidden"/>
+                                      </p:to>
+                                    </p:set>
+                                  </p:childTnLst>
+                                </p:cTn>
+                              </p:par>
+                            </p:childTnLst>
+                          </p:cTn>
+                        </p:par>
+                      </p:childTnLst>
+                    </p:cTn>
+                  </p:par>
+                </p:childTnLst>
+              </p:cTn>
+              <p:nextCondLst>
+                <p:cond evt="onClick" delay="0">
+                  <p:tgtEl>
+                    <p:spTgt spid="22"/>
+                  </p:tgtEl>
+                </p:cond>
+              </p:nextCondLst>
+            </p:seq>
+            <p:seq concurrent="1" nextAc="seek">
+              <p:cTn id="57" restart="whenNotActive" fill="hold" evtFilter="cancelBubble" nodeType="interactiveSeq">
+                <p:stCondLst>
+                  <p:cond evt="onClick" delay="0">
+                    <p:tgtEl>
+                      <p:spTgt spid="23"/>
+                    </p:tgtEl>
+                  </p:cond>
+                </p:stCondLst>
+                <p:endSync evt="end" delay="0">
+                  <p:rtn val="all"/>
+                </p:endSync>
+                <p:childTnLst>
+                  <p:par>
+                    <p:cTn id="58" fill="hold">
+                      <p:stCondLst>
+                        <p:cond delay="0"/>
+                      </p:stCondLst>
+                      <p:childTnLst>
+                        <p:par>
+                          <p:cTn id="59" fill="hold">
+                            <p:stCondLst>
+                              <p:cond delay="0"/>
+                            </p:stCondLst>
+                            <p:childTnLst>
+                              <p:par>
+                                <p:cTn id="60" presetID="10" presetClass="entr" presetSubtype="0" fill="hold" grpId="0" nodeType="clickEffect">
+                                  <p:stCondLst>
+                                    <p:cond delay="0"/>
+                                  </p:stCondLst>
+                                  <p:childTnLst>
+                                    <p:set>
+                                      <p:cBhvr>
+                                        <p:cTn id="61" dur="1" fill="hold">
+                                          <p:stCondLst>
+                                            <p:cond delay="0"/>
+                                          </p:stCondLst>
+                                        </p:cTn>
+                                        <p:tgtEl>
+                                          <p:spTgt spid="15"/>
+                                        </p:tgtEl>
+                                        <p:attrNameLst>
+                                          <p:attrName>style.visibility</p:attrName>
+                                        </p:attrNameLst>
+                                      </p:cBhvr>
+                                      <p:to>
+                                        <p:strVal val="visible"/>
+                                      </p:to>
+                                    </p:set>
+                                    <p:animEffect transition="in" filter="fade">
+                                      <p:cBhvr>
+                                        <p:cTn id="62" dur="500"/>
+                                        <p:tgtEl>
+                                          <p:spTgt spid="15"/>
+                                        </p:tgtEl>
+                                      </p:cBhvr>
+                                    </p:animEffect>
+                                  </p:childTnLst>
+                                </p:cTn>
+                              </p:par>
+                            </p:childTnLst>
+                          </p:cTn>
+                        </p:par>
+                      </p:childTnLst>
+                    </p:cTn>
+                  </p:par>
+                  <p:par>
+                    <p:cTn id="63" fill="hold">
+                      <p:stCondLst>
+                        <p:cond delay="indefinite"/>
+                      </p:stCondLst>
+                      <p:childTnLst>
+                        <p:par>
+                          <p:cTn id="64" fill="hold">
+                            <p:stCondLst>
+                              <p:cond delay="0"/>
+                            </p:stCondLst>
+                            <p:childTnLst>
+                              <p:par>
+                                <p:cTn id="65" presetID="10" presetClass="exit" presetSubtype="0" fill="hold" grpId="1" nodeType="clickEffect">
+                                  <p:stCondLst>
+                                    <p:cond delay="0"/>
+                                  </p:stCondLst>
+                                  <p:childTnLst>
+                                    <p:animEffect transition="out" filter="fade">
+                                      <p:cBhvr>
+                                        <p:cTn id="66" dur="500"/>
+                                        <p:tgtEl>
+                                          <p:spTgt spid="15"/>
+                                        </p:tgtEl>
+                                      </p:cBhvr>
+                                    </p:animEffect>
+                                    <p:set>
+                                      <p:cBhvr>
+                                        <p:cTn id="67" dur="1" fill="hold">
+                                          <p:stCondLst>
+                                            <p:cond delay="499"/>
+                                          </p:stCondLst>
+                                        </p:cTn>
+                                        <p:tgtEl>
+                                          <p:spTgt spid="15"/>
+                                        </p:tgtEl>
+                                        <p:attrNameLst>
+                                          <p:attrName>style.visibility</p:attrName>
+                                        </p:attrNameLst>
+                                      </p:cBhvr>
+                                      <p:to>
+                                        <p:strVal val="hidden"/>
+                                      </p:to>
+                                    </p:set>
+                                  </p:childTnLst>
+                                </p:cTn>
+                              </p:par>
+                            </p:childTnLst>
+                          </p:cTn>
+                        </p:par>
+                      </p:childTnLst>
+                    </p:cTn>
+                  </p:par>
+                </p:childTnLst>
+              </p:cTn>
+              <p:nextCondLst>
+                <p:cond evt="onClick" delay="0">
+                  <p:tgtEl>
+                    <p:spTgt spid="23"/>
+                  </p:tgtEl>
+                </p:cond>
+              </p:nextCondLst>
+            </p:seq>
+            <p:seq concurrent="1" nextAc="seek">
+              <p:cTn id="68" restart="whenNotActive" fill="hold" evtFilter="cancelBubble" nodeType="interactiveSeq">
+                <p:stCondLst>
+                  <p:cond evt="onClick" delay="0">
+                    <p:tgtEl>
+                      <p:spTgt spid="24"/>
+                    </p:tgtEl>
+                  </p:cond>
+                </p:stCondLst>
+                <p:endSync evt="end" delay="0">
+                  <p:rtn val="all"/>
+                </p:endSync>
+                <p:childTnLst>
+                  <p:par>
+                    <p:cTn id="69" fill="hold">
+                      <p:stCondLst>
+                        <p:cond delay="0"/>
+                      </p:stCondLst>
+                      <p:childTnLst>
+                        <p:par>
+                          <p:cTn id="70" fill="hold">
+                            <p:stCondLst>
+                              <p:cond delay="0"/>
+                            </p:stCondLst>
+                            <p:childTnLst>
+                              <p:par>
+                                <p:cTn id="71" presetID="10" presetClass="entr" presetSubtype="0" fill="hold" grpId="0" nodeType="clickEffect">
+                                  <p:stCondLst>
+                                    <p:cond delay="0"/>
+                                  </p:stCondLst>
+                                  <p:childTnLst>
+                                    <p:set>
+                                      <p:cBhvr>
+                                        <p:cTn id="72" dur="1" fill="hold">
+                                          <p:stCondLst>
+                                            <p:cond delay="0"/>
+                                          </p:stCondLst>
+                                        </p:cTn>
+                                        <p:tgtEl>
+                                          <p:spTgt spid="16"/>
+                                        </p:tgtEl>
+                                        <p:attrNameLst>
+                                          <p:attrName>style.visibility</p:attrName>
+                                        </p:attrNameLst>
+                                      </p:cBhvr>
+                                      <p:to>
+                                        <p:strVal val="visible"/>
+                                      </p:to>
+                                    </p:set>
+                                    <p:animEffect transition="in" filter="fade">
+                                      <p:cBhvr>
+                                        <p:cTn id="73" dur="500"/>
+                                        <p:tgtEl>
+                                          <p:spTgt spid="16"/>
+                                        </p:tgtEl>
+                                      </p:cBhvr>
+                                    </p:animEffect>
+                                  </p:childTnLst>
+                                </p:cTn>
+                              </p:par>
+                            </p:childTnLst>
+                          </p:cTn>
+                        </p:par>
+                      </p:childTnLst>
+                    </p:cTn>
+                  </p:par>
+                  <p:par>
+                    <p:cTn id="74" fill="hold">
+                      <p:stCondLst>
+                        <p:cond delay="indefinite"/>
+                      </p:stCondLst>
+                      <p:childTnLst>
+                        <p:par>
+                          <p:cTn id="75" fill="hold">
+                            <p:stCondLst>
+                              <p:cond delay="0"/>
+                            </p:stCondLst>
+                            <p:childTnLst>
+                              <p:par>
+                                <p:cTn id="76" presetID="10" presetClass="exit" presetSubtype="0" fill="hold" grpId="1" nodeType="clickEffect">
+                                  <p:stCondLst>
+                                    <p:cond delay="0"/>
+                                  </p:stCondLst>
+                                  <p:childTnLst>
+                                    <p:animEffect transition="out" filter="fade">
+                                      <p:cBhvr>
+                                        <p:cTn id="77" dur="500"/>
+                                        <p:tgtEl>
+                                          <p:spTgt spid="16"/>
+                                        </p:tgtEl>
+                                      </p:cBhvr>
+                                    </p:animEffect>
+                                    <p:set>
+                                      <p:cBhvr>
+                                        <p:cTn id="78" dur="1" fill="hold">
+                                          <p:stCondLst>
+                                            <p:cond delay="499"/>
+                                          </p:stCondLst>
+                                        </p:cTn>
+                                        <p:tgtEl>
+                                          <p:spTgt spid="16"/>
+                                        </p:tgtEl>
+                                        <p:attrNameLst>
+                                          <p:attrName>style.visibility</p:attrName>
+                                        </p:attrNameLst>
+                                      </p:cBhvr>
+                                      <p:to>
+                                        <p:strVal val="hidden"/>
+                                      </p:to>
+                                    </p:set>
+                                  </p:childTnLst>
+                                </p:cTn>
+                              </p:par>
+                            </p:childTnLst>
+                          </p:cTn>
+                        </p:par>
+                      </p:childTnLst>
+                    </p:cTn>
+                  </p:par>
+                </p:childTnLst>
+              </p:cTn>
+              <p:nextCondLst>
+                <p:cond evt="onClick" delay="0">
+                  <p:tgtEl>
+                    <p:spTgt spid="24"/>
+                  </p:tgtEl>
+                </p:cond>
+              </p:nextCondLst>
+            </p:seq>
+            <p:seq concurrent="1" nextAc="seek">
+              <p:cTn id="79" restart="whenNotActive" fill="hold" evtFilter="cancelBubble" nodeType="interactiveSeq">
+                <p:stCondLst>
+                  <p:cond evt="onClick" delay="0">
+                    <p:tgtEl>
+                      <p:spTgt spid="25"/>
+                    </p:tgtEl>
+                  </p:cond>
+                </p:stCondLst>
+                <p:endSync evt="end" delay="0">
+                  <p:rtn val="all"/>
+                </p:endSync>
+                <p:childTnLst>
+                  <p:par>
+                    <p:cTn id="80" fill="hold">
+                      <p:stCondLst>
+                        <p:cond delay="0"/>
+                      </p:stCondLst>
+                      <p:childTnLst>
+                        <p:par>
+                          <p:cTn id="81" fill="hold">
+                            <p:stCondLst>
+                              <p:cond delay="0"/>
+                            </p:stCondLst>
+                            <p:childTnLst>
+                              <p:par>
+                                <p:cTn id="82" presetID="10" presetClass="entr" presetSubtype="0" fill="hold" grpId="0" nodeType="clickEffect">
+                                  <p:stCondLst>
+                                    <p:cond delay="0"/>
+                                  </p:stCondLst>
+                                  <p:childTnLst>
+                                    <p:set>
+                                      <p:cBhvr>
+                                        <p:cTn id="83" dur="1" fill="hold">
+                                          <p:stCondLst>
+                                            <p:cond delay="0"/>
+                                          </p:stCondLst>
+                                        </p:cTn>
+                                        <p:tgtEl>
+                                          <p:spTgt spid="18"/>
+                                        </p:tgtEl>
+                                        <p:attrNameLst>
+                                          <p:attrName>style.visibility</p:attrName>
+                                        </p:attrNameLst>
+                                      </p:cBhvr>
+                                      <p:to>
+                                        <p:strVal val="visible"/>
+                                      </p:to>
+                                    </p:set>
+                                    <p:animEffect transition="in" filter="fade">
+                                      <p:cBhvr>
+                                        <p:cTn id="84" dur="500"/>
+                                        <p:tgtEl>
+                                          <p:spTgt spid="18"/>
+                                        </p:tgtEl>
+                                      </p:cBhvr>
+                                    </p:animEffect>
+                                  </p:childTnLst>
+                                </p:cTn>
+                              </p:par>
+                            </p:childTnLst>
+                          </p:cTn>
+                        </p:par>
+                      </p:childTnLst>
+                    </p:cTn>
+                  </p:par>
+                  <p:par>
+                    <p:cTn id="85" fill="hold">
+                      <p:stCondLst>
+                        <p:cond delay="indefinite"/>
+                      </p:stCondLst>
+                      <p:childTnLst>
+                        <p:par>
+                          <p:cTn id="86" fill="hold">
+                            <p:stCondLst>
+                              <p:cond delay="0"/>
+                            </p:stCondLst>
+                            <p:childTnLst>
+                              <p:par>
+                                <p:cTn id="87" presetID="10" presetClass="exit" presetSubtype="0" fill="hold" grpId="1" nodeType="clickEffect">
+                                  <p:stCondLst>
+                                    <p:cond delay="0"/>
+                                  </p:stCondLst>
+                                  <p:childTnLst>
+                                    <p:animEffect transition="out" filter="fade">
+                                      <p:cBhvr>
+                                        <p:cTn id="88" dur="500"/>
+                                        <p:tgtEl>
+                                          <p:spTgt spid="18"/>
+                                        </p:tgtEl>
+                                      </p:cBhvr>
+                                    </p:animEffect>
+                                    <p:set>
+                                      <p:cBhvr>
+                                        <p:cTn id="89" dur="1" fill="hold">
+                                          <p:stCondLst>
+                                            <p:cond delay="499"/>
+                                          </p:stCondLst>
+                                        </p:cTn>
+                                        <p:tgtEl>
+                                          <p:spTgt spid="18"/>
+                                        </p:tgtEl>
+                                        <p:attrNameLst>
+                                          <p:attrName>style.visibility</p:attrName>
+                                        </p:attrNameLst>
+                                      </p:cBhvr>
+                                      <p:to>
+                                        <p:strVal val="hidden"/>
+                                      </p:to>
+                                    </p:set>
+                                  </p:childTnLst>
+                                </p:cTn>
+                              </p:par>
+                            </p:childTnLst>
+                          </p:cTn>
+                        </p:par>
+                      </p:childTnLst>
+                    </p:cTn>
+                  </p:par>
+                </p:childTnLst>
+              </p:cTn>
+              <p:nextCondLst>
+                <p:cond evt="onClick" delay="0">
+                  <p:tgtEl>
+                    <p:spTgt spid="25"/>
+                  </p:tgtEl>
+                </p:cond>
+              </p:nextCondLst>
+            </p:seq>
+          </p:childTnLst>
+        </p:cTn>
+      </p:par>
+    </p:tnLst>
+    <p:bldLst>
+      <p:bldP spid="10" grpId="0" animBg="1"/>
+      <p:bldP spid="10" grpId="1" animBg="1"/>
+      <p:bldP spid="11" grpId="0" animBg="1"/>
+      <p:bldP spid="11" grpId="1" animBg="1"/>
+      <p:bldP spid="12" grpId="0" animBg="1"/>
+      <p:bldP spid="12" grpId="1" animBg="1"/>
+      <p:bldP spid="13" grpId="0" animBg="1"/>
+      <p:bldP spid="13" grpId="1" animBg="1"/>
+      <p:bldP spid="14" grpId="0" animBg="1"/>
+      <p:bldP spid="14" grpId="1" animBg="1"/>
+      <p:bldP spid="15" grpId="0" animBg="1"/>
+      <p:bldP spid="15" grpId="1" animBg="1"/>
+      <p:bldP spid="16" grpId="0" animBg="1"/>
+      <p:bldP spid="16" grpId="1" animBg="1"/>
+      <p:bldP spid="18" grpId="0" animBg="1"/>
+      <p:bldP spid="18" grpId="1" animBg="1"/>
+    </p:bldLst>
+  </p:timing>
+</p:sld>
+</file>
+
+<file path=ppt/slides/slide21.xml><?xml version="1.0" encoding="utf-8"?>
 <p:sld xmlns:a="http://schemas.openxmlformats.org/drawingml/2006/main" xmlns:r="http://schemas.openxmlformats.org/officeDocument/2006/relationships" xmlns:p="http://schemas.openxmlformats.org/presentationml/2006/main" show="0">
   <p:cSld name="PPTLabsAcknowledgementSlide">
     <p:spTree>
@@ -18402,101 +21427,6 @@
 </p:sld>
 </file>
 
-<file path=ppt/slides/slide2.xml><?xml version="1.0" encoding="utf-8"?>
-<p:sld xmlns:a="http://schemas.openxmlformats.org/drawingml/2006/main" xmlns:r="http://schemas.openxmlformats.org/officeDocument/2006/relationships" xmlns:p="http://schemas.openxmlformats.org/presentationml/2006/main">
-  <p:cSld>
-    <p:bg>
-      <p:bgPr>
-        <a:solidFill>
-          <a:srgbClr val="E46C0A"/>
-        </a:solidFill>
-        <a:effectLst/>
-      </p:bgPr>
-    </p:bg>
-    <p:spTree>
-      <p:nvGrpSpPr>
-        <p:cNvPr id="1" name=""/>
-        <p:cNvGrpSpPr/>
-        <p:nvPr/>
-      </p:nvGrpSpPr>
-      <p:grpSpPr>
-        <a:xfrm>
-          <a:off x="0" y="0"/>
-          <a:ext cx="0" cy="0"/>
-          <a:chOff x="0" y="0"/>
-          <a:chExt cx="0" cy="0"/>
-        </a:xfrm>
-      </p:grpSpPr>
-      <p:sp>
-        <p:nvSpPr>
-          <p:cNvPr id="2" name="Title 1"/>
-          <p:cNvSpPr>
-            <a:spLocks noGrp="1"/>
-          </p:cNvSpPr>
-          <p:nvPr>
-            <p:ph type="title"/>
-          </p:nvPr>
-        </p:nvSpPr>
-        <p:spPr>
-          <a:xfrm>
-            <a:off x="381000" y="609600"/>
-            <a:ext cx="8229600" cy="1143000"/>
-          </a:xfrm>
-          <a:solidFill>
-            <a:srgbClr val="E46C0A"/>
-          </a:solidFill>
-        </p:spPr>
-        <p:txBody>
-          <a:bodyPr>
-            <a:noAutofit/>
-          </a:bodyPr>
-          <a:lstStyle/>
-          <a:p>
-            <a:pPr algn="l"/>
-            <a:r>
-              <a:rPr lang="en-US" sz="7200" dirty="0" smtClean="0">
-                <a:solidFill>
-                  <a:schemeClr val="bg1"/>
-                </a:solidFill>
-              </a:rPr>
-              <a:t>Create </a:t>
-            </a:r>
-            <a:r>
-              <a:rPr lang="en-US" sz="7200" dirty="0" smtClean="0">
-                <a:solidFill>
-                  <a:schemeClr val="bg1"/>
-                </a:solidFill>
-              </a:rPr>
-              <a:t>Callout</a:t>
-            </a:r>
-            <a:endParaRPr lang="en-SG" sz="7200" dirty="0">
-              <a:solidFill>
-                <a:schemeClr val="bg1"/>
-              </a:solidFill>
-            </a:endParaRPr>
-          </a:p>
-        </p:txBody>
-      </p:sp>
-    </p:spTree>
-    <p:extLst>
-      <p:ext uri="{BB962C8B-B14F-4D97-AF65-F5344CB8AC3E}">
-        <p14:creationId xmlns:p14="http://schemas.microsoft.com/office/powerpoint/2010/main" val="1569131388"/>
-      </p:ext>
-    </p:extLst>
-  </p:cSld>
-  <p:clrMapOvr>
-    <a:masterClrMapping/>
-  </p:clrMapOvr>
-  <p:timing>
-    <p:tnLst>
-      <p:par>
-        <p:cTn id="1" dur="indefinite" restart="never" nodeType="tmRoot"/>
-      </p:par>
-    </p:tnLst>
-  </p:timing>
-</p:sld>
-</file>
-
 <file path=ppt/slides/slide3.xml><?xml version="1.0" encoding="utf-8"?>
 <p:sld xmlns:a="http://schemas.openxmlformats.org/drawingml/2006/main" xmlns:r="http://schemas.openxmlformats.org/officeDocument/2006/relationships" xmlns:p="http://schemas.openxmlformats.org/presentationml/2006/main">
   <p:cSld>
@@ -18543,11 +21473,7 @@
           <a:p>
             <a:r>
               <a:rPr lang="en-US" dirty="0" smtClean="0"/>
-              <a:t>Create </a:t>
-            </a:r>
-            <a:r>
-              <a:rPr lang="en-US" dirty="0" smtClean="0"/>
-              <a:t>Callout: Select Normal Shape</a:t>
+              <a:t>Create Callout: Select Normal Shape</a:t>
             </a:r>
             <a:endParaRPr lang="en-SG" dirty="0"/>
           </a:p>
@@ -18577,16 +21503,11 @@
               <a:rPr lang="en-US" dirty="0" smtClean="0"/>
               <a:t>Select normal shape</a:t>
             </a:r>
-            <a:endParaRPr lang="en-US" dirty="0" smtClean="0"/>
           </a:p>
           <a:p>
             <a:r>
               <a:rPr lang="en-US" dirty="0" smtClean="0"/>
-              <a:t>Click ‘Create </a:t>
-            </a:r>
-            <a:r>
-              <a:rPr lang="en-US" dirty="0" smtClean="0"/>
-              <a:t>Callout for Shape’</a:t>
+              <a:t>Click ‘Create Callout for Shape’</a:t>
             </a:r>
             <a:endParaRPr lang="en-SG" dirty="0"/>
           </a:p>
@@ -19019,11 +21940,7 @@
           <a:p>
             <a:r>
               <a:rPr lang="en-US" dirty="0" smtClean="0"/>
-              <a:t>Create </a:t>
-            </a:r>
-            <a:r>
-              <a:rPr lang="en-US" dirty="0" smtClean="0"/>
-              <a:t>Callout: Select existing trigger shape</a:t>
+              <a:t>Create Callout: Select existing trigger shape</a:t>
             </a:r>
             <a:endParaRPr lang="en-SG" dirty="0"/>
           </a:p>
@@ -19053,16 +21970,11 @@
               <a:rPr lang="en-US" dirty="0" smtClean="0"/>
               <a:t>Select the trigger Shape</a:t>
             </a:r>
-            <a:endParaRPr lang="en-US" dirty="0" smtClean="0"/>
           </a:p>
           <a:p>
             <a:r>
               <a:rPr lang="en-US" dirty="0" smtClean="0"/>
-              <a:t>Click ‘Create </a:t>
-            </a:r>
-            <a:r>
-              <a:rPr lang="en-US" dirty="0" smtClean="0"/>
-              <a:t>Callout for Shape’</a:t>
+              <a:t>Click ‘Create Callout for Shape’</a:t>
             </a:r>
             <a:endParaRPr lang="en-SG" dirty="0"/>
           </a:p>
@@ -19979,11 +22891,7 @@
           <a:p>
             <a:r>
               <a:rPr lang="en-US" dirty="0" smtClean="0"/>
-              <a:t>Create </a:t>
-            </a:r>
-            <a:r>
-              <a:rPr lang="en-US" dirty="0" smtClean="0"/>
-              <a:t>Callout: Select existing callout shape</a:t>
+              <a:t>Create Callout: Select existing callout shape</a:t>
             </a:r>
             <a:endParaRPr lang="en-SG" dirty="0"/>
           </a:p>
@@ -20013,16 +22921,11 @@
               <a:rPr lang="en-US" dirty="0" smtClean="0"/>
               <a:t>Select the callout Shape</a:t>
             </a:r>
-            <a:endParaRPr lang="en-US" dirty="0" smtClean="0"/>
           </a:p>
           <a:p>
             <a:r>
               <a:rPr lang="en-US" dirty="0" smtClean="0"/>
-              <a:t>Click ‘Create </a:t>
-            </a:r>
-            <a:r>
-              <a:rPr lang="en-US" dirty="0" smtClean="0"/>
-              <a:t>Callout for Shape’</a:t>
+              <a:t>Click ‘Create Callout for Shape’</a:t>
             </a:r>
             <a:endParaRPr lang="en-SG" dirty="0"/>
           </a:p>

</xml_diff>